<commit_message>
Last changes to maven presentation
</commit_message>
<xml_diff>
--- a/slides/2_maven.pptx
+++ b/slides/2_maven.pptx
@@ -9,13 +9,13 @@
   </p:notesMasterIdLst>
   <p:sldIdLst>
     <p:sldId id="256" r:id="rId2"/>
-    <p:sldId id="257" r:id="rId3"/>
-    <p:sldId id="258" r:id="rId4"/>
-    <p:sldId id="259" r:id="rId5"/>
-    <p:sldId id="261" r:id="rId6"/>
-    <p:sldId id="263" r:id="rId7"/>
-    <p:sldId id="264" r:id="rId8"/>
-    <p:sldId id="265" r:id="rId9"/>
+    <p:sldId id="258" r:id="rId3"/>
+    <p:sldId id="259" r:id="rId4"/>
+    <p:sldId id="261" r:id="rId5"/>
+    <p:sldId id="263" r:id="rId6"/>
+    <p:sldId id="264" r:id="rId7"/>
+    <p:sldId id="265" r:id="rId8"/>
+    <p:sldId id="278" r:id="rId9"/>
     <p:sldId id="262" r:id="rId10"/>
     <p:sldId id="267" r:id="rId11"/>
     <p:sldId id="269" r:id="rId12"/>
@@ -328,6 +328,11 @@
       </a:defRPr>
     </a:lvl9pPr>
   </p:defaultTextStyle>
+  <p:extLst>
+    <p:ext uri="{EFAFB233-063F-42B5-8137-9DF3F51BA10A}">
+      <p15:sldGuideLst xmlns:p15="http://schemas.microsoft.com/office/powerpoint/2012/main"/>
+    </p:ext>
+  </p:extLst>
 </p:presentation>
 </file>
 
@@ -537,7 +542,7 @@
       </p:grpSpPr>
       <p:sp>
         <p:nvSpPr>
-          <p:cNvPr id="141" name="Shape 141"/>
+          <p:cNvPr id="2" name="Folienbildplatzhalter 1"/>
           <p:cNvSpPr>
             <a:spLocks noGrp="1" noRot="1" noChangeAspect="1"/>
           </p:cNvSpPr>
@@ -545,112 +550,33 @@
             <p:ph type="sldImg"/>
           </p:nvPr>
         </p:nvSpPr>
-        <p:spPr>
-          <a:prstGeom prst="rect">
-            <a:avLst/>
-          </a:prstGeom>
-        </p:spPr>
-        <p:txBody>
-          <a:bodyPr/>
-          <a:lstStyle/>
-          <a:p>
-            <a:endParaRPr/>
-          </a:p>
-        </p:txBody>
+        <p:spPr/>
       </p:sp>
       <p:sp>
         <p:nvSpPr>
-          <p:cNvPr id="142" name="Shape 142"/>
+          <p:cNvPr id="3" name="Notizenplatzhalter 2"/>
           <p:cNvSpPr>
             <a:spLocks noGrp="1"/>
           </p:cNvSpPr>
           <p:nvPr>
-            <p:ph type="body" sz="quarter" idx="1"/>
+            <p:ph type="body" idx="1"/>
           </p:nvPr>
         </p:nvSpPr>
-        <p:spPr>
-          <a:prstGeom prst="rect">
-            <a:avLst/>
-          </a:prstGeom>
-        </p:spPr>
+        <p:spPr/>
         <p:txBody>
           <a:bodyPr/>
           <a:lstStyle/>
           <a:p>
-            <a:r>
-              <a:rPr dirty="0"/>
-              <a:t>- IDEs also can build projects. But first, not all developers use the same IDE. You might use Eclipse, somebody else might use </a:t>
-            </a:r>
-            <a:r>
-              <a:rPr lang="de-DE" dirty="0" err="1"/>
-              <a:t>intellij</a:t>
-            </a:r>
-            <a:r>
-              <a:rPr dirty="0"/>
-              <a:t>. The idea is to abstract the build process from the</a:t>
-            </a:r>
-            <a:r>
-              <a:rPr lang="de-DE" dirty="0"/>
-              <a:t> DIE</a:t>
-            </a:r>
-          </a:p>
-          <a:p>
-            <a:endParaRPr lang="de-DE" dirty="0"/>
-          </a:p>
-          <a:p>
-            <a:r>
-              <a:rPr lang="de-DE" dirty="0"/>
-              <a:t>- Wie ihr in der </a:t>
-            </a:r>
-            <a:r>
-              <a:rPr lang="de-DE" dirty="0" err="1"/>
-              <a:t>folie</a:t>
-            </a:r>
-            <a:r>
-              <a:rPr lang="de-DE" dirty="0"/>
-              <a:t> sehen könnt, bietet </a:t>
-            </a:r>
-            <a:r>
-              <a:rPr lang="de-DE" dirty="0" err="1"/>
-              <a:t>maven</a:t>
-            </a:r>
-            <a:r>
-              <a:rPr lang="de-DE" dirty="0"/>
-              <a:t> dadurch u.a. einen einfachen weg alle </a:t>
-            </a:r>
-            <a:r>
-              <a:rPr lang="de-DE" dirty="0" err="1"/>
-              <a:t>tests</a:t>
-            </a:r>
-            <a:r>
-              <a:rPr lang="de-DE" dirty="0"/>
-              <a:t> auszuführen, automatisch </a:t>
-            </a:r>
-            <a:r>
-              <a:rPr lang="de-DE" dirty="0" err="1"/>
-              <a:t>javadoc</a:t>
-            </a:r>
-            <a:r>
-              <a:rPr lang="de-DE" dirty="0"/>
-              <a:t> zu generieren oder einfach das ganze </a:t>
-            </a:r>
-            <a:r>
-              <a:rPr lang="de-DE" dirty="0" err="1"/>
-              <a:t>projekt</a:t>
-            </a:r>
-            <a:r>
-              <a:rPr lang="de-DE" dirty="0"/>
-              <a:t> zu </a:t>
-            </a:r>
-            <a:r>
-              <a:rPr lang="de-DE" dirty="0" err="1"/>
-              <a:t>compilen</a:t>
-            </a:r>
-            <a:endParaRPr dirty="0"/>
+            <a:endParaRPr lang="en-CH" dirty="0"/>
           </a:p>
         </p:txBody>
       </p:sp>
     </p:spTree>
+    <p:extLst>
+      <p:ext uri="{BB962C8B-B14F-4D97-AF65-F5344CB8AC3E}">
+        <p14:creationId xmlns:p14="http://schemas.microsoft.com/office/powerpoint/2010/main" val="2134392827"/>
+      </p:ext>
+    </p:extLst>
   </p:cSld>
   <p:clrMapOvr>
     <a:masterClrMapping/>
@@ -702,25 +628,34 @@
           <a:bodyPr/>
           <a:lstStyle/>
           <a:p>
+            <a:pPr marL="0" marR="0" lvl="0" indent="0" defTabSz="457200" eaLnBrk="1" fontAlgn="auto" latinLnBrk="0" hangingPunct="1">
+              <a:lnSpc>
+                <a:spcPct val="117999"/>
+              </a:lnSpc>
+              <a:spcBef>
+                <a:spcPts val="0"/>
+              </a:spcBef>
+              <a:spcAft>
+                <a:spcPts val="0"/>
+              </a:spcAft>
+              <a:buClrTx/>
+              <a:buSzTx/>
+              <a:buFontTx/>
+              <a:buNone/>
+              <a:tabLst/>
+              <a:defRPr/>
+            </a:pPr>
             <a:r>
               <a:rPr lang="de-DE" dirty="0"/>
-              <a:t>Hier seht ihr </a:t>
+              <a:t>Man kann auch weitere </a:t>
             </a:r>
             <a:r>
               <a:rPr lang="de-DE" dirty="0" err="1"/>
-              <a:t>z.b.</a:t>
+              <a:t>plugnis</a:t>
             </a:r>
             <a:r>
               <a:rPr lang="de-DE" dirty="0"/>
-              <a:t> ein </a:t>
-            </a:r>
-            <a:r>
-              <a:rPr lang="de-DE" dirty="0" err="1"/>
-              <a:t>plugin</a:t>
-            </a:r>
-            <a:r>
-              <a:rPr lang="de-DE" dirty="0"/>
-              <a:t> welches während dem </a:t>
+              <a:t> hinzufügen welche dann in den </a:t>
             </a:r>
             <a:r>
               <a:rPr lang="de-DE" dirty="0" err="1"/>
@@ -736,16 +671,11 @@
             </a:r>
             <a:r>
               <a:rPr lang="de-DE" dirty="0"/>
-              <a:t> von </a:t>
-            </a:r>
-            <a:r>
-              <a:rPr lang="de-DE" dirty="0" err="1"/>
-              <a:t>maven</a:t>
-            </a:r>
-            <a:r>
-              <a:rPr lang="de-DE" dirty="0"/>
-              <a:t> ausgeführt wird.</a:t>
-            </a:r>
+              <a:t> eingebaut werden können</a:t>
+            </a:r>
+            <a:endParaRPr lang="en-CH" dirty="0"/>
+          </a:p>
+          <a:p>
             <a:endParaRPr lang="en-CH" dirty="0"/>
           </a:p>
         </p:txBody>
@@ -753,7 +683,7 @@
     </p:spTree>
     <p:extLst>
       <p:ext uri="{BB962C8B-B14F-4D97-AF65-F5344CB8AC3E}">
-        <p14:creationId xmlns:p14="http://schemas.microsoft.com/office/powerpoint/2010/main" val="3714176965"/>
+        <p14:creationId xmlns:p14="http://schemas.microsoft.com/office/powerpoint/2010/main" val="1739666193"/>
       </p:ext>
     </p:extLst>
   </p:cSld>
@@ -809,13 +739,47 @@
           <a:p>
             <a:r>
               <a:rPr lang="de-DE" dirty="0"/>
-              <a:t>Zusammenfassung: </a:t>
-            </a:r>
-          </a:p>
-          <a:p>
+              <a:t>Hier seht ihr </a:t>
+            </a:r>
+            <a:r>
+              <a:rPr lang="de-DE" dirty="0" err="1"/>
+              <a:t>z.b.</a:t>
+            </a:r>
             <a:r>
               <a:rPr lang="de-DE" dirty="0"/>
-              <a:t>- Wir starten mit dem archetype</a:t>
+              <a:t> ein </a:t>
+            </a:r>
+            <a:r>
+              <a:rPr lang="de-DE" dirty="0" err="1"/>
+              <a:t>plugin</a:t>
+            </a:r>
+            <a:r>
+              <a:rPr lang="de-DE" dirty="0"/>
+              <a:t> welches während dem </a:t>
+            </a:r>
+            <a:r>
+              <a:rPr lang="de-DE" dirty="0" err="1"/>
+              <a:t>build</a:t>
+            </a:r>
+            <a:r>
+              <a:rPr lang="de-DE" dirty="0"/>
+              <a:t> </a:t>
+            </a:r>
+            <a:r>
+              <a:rPr lang="de-DE" dirty="0" err="1"/>
+              <a:t>prozess</a:t>
+            </a:r>
+            <a:r>
+              <a:rPr lang="de-DE" dirty="0"/>
+              <a:t> von </a:t>
+            </a:r>
+            <a:r>
+              <a:rPr lang="de-DE" dirty="0" err="1"/>
+              <a:t>maven</a:t>
+            </a:r>
+            <a:r>
+              <a:rPr lang="de-DE" dirty="0"/>
+              <a:t> ausgeführt wird.</a:t>
             </a:r>
             <a:endParaRPr lang="en-CH" dirty="0"/>
           </a:p>
@@ -824,7 +788,7 @@
     </p:spTree>
     <p:extLst>
       <p:ext uri="{BB962C8B-B14F-4D97-AF65-F5344CB8AC3E}">
-        <p14:creationId xmlns:p14="http://schemas.microsoft.com/office/powerpoint/2010/main" val="128179375"/>
+        <p14:creationId xmlns:p14="http://schemas.microsoft.com/office/powerpoint/2010/main" val="3714176965"/>
       </p:ext>
     </p:extLst>
   </p:cSld>
@@ -880,31 +844,13 @@
           <a:p>
             <a:r>
               <a:rPr lang="de-DE" dirty="0"/>
-              <a:t>Dieser baut uns ein </a:t>
-            </a:r>
-            <a:r>
-              <a:rPr lang="de-DE" dirty="0" err="1"/>
-              <a:t>proekt</a:t>
-            </a:r>
+              <a:t>Zusammenfassung: </a:t>
+            </a:r>
+          </a:p>
+          <a:p>
             <a:r>
               <a:rPr lang="de-DE" dirty="0"/>
-              <a:t> mit einer </a:t>
-            </a:r>
-            <a:r>
-              <a:rPr lang="de-DE" dirty="0" err="1"/>
-              <a:t>bestimten</a:t>
-            </a:r>
-            <a:r>
-              <a:rPr lang="de-DE" dirty="0"/>
-              <a:t> </a:t>
-            </a:r>
-            <a:r>
-              <a:rPr lang="de-DE" dirty="0" err="1"/>
-              <a:t>projektstrutktur</a:t>
-            </a:r>
-            <a:r>
-              <a:rPr lang="de-DE" dirty="0"/>
-              <a:t> und einem pom.xml</a:t>
+              <a:t>- Wir starten mit dem archetype</a:t>
             </a:r>
             <a:endParaRPr lang="en-CH" dirty="0"/>
           </a:p>
@@ -913,7 +859,7 @@
     </p:spTree>
     <p:extLst>
       <p:ext uri="{BB962C8B-B14F-4D97-AF65-F5344CB8AC3E}">
-        <p14:creationId xmlns:p14="http://schemas.microsoft.com/office/powerpoint/2010/main" val="104606311"/>
+        <p14:creationId xmlns:p14="http://schemas.microsoft.com/office/powerpoint/2010/main" val="128179375"/>
       </p:ext>
     </p:extLst>
   </p:cSld>
@@ -968,24 +914,20 @@
           <a:lstStyle/>
           <a:p>
             <a:r>
+              <a:rPr lang="de-DE" dirty="0"/>
+              <a:t>Dieser baut uns ein </a:t>
+            </a:r>
+            <a:r>
               <a:rPr lang="de-DE" dirty="0" err="1"/>
-              <a:t>maven</a:t>
+              <a:t>proekt</a:t>
             </a:r>
             <a:r>
               <a:rPr lang="de-DE" dirty="0"/>
-              <a:t> holt dann die </a:t>
+              <a:t> mit einer </a:t>
             </a:r>
             <a:r>
               <a:rPr lang="de-DE" dirty="0" err="1"/>
-              <a:t>dependencies</a:t>
-            </a:r>
-            <a:r>
-              <a:rPr lang="de-DE" dirty="0"/>
-              <a:t> welche im </a:t>
-            </a:r>
-            <a:r>
-              <a:rPr lang="de-DE" dirty="0" err="1"/>
-              <a:t>pom</a:t>
+              <a:t>bestimten</a:t>
             </a:r>
             <a:r>
               <a:rPr lang="de-DE" dirty="0"/>
@@ -993,11 +935,11 @@
             </a:r>
             <a:r>
               <a:rPr lang="de-DE" dirty="0" err="1"/>
-              <a:t>xml</a:t>
+              <a:t>projektstrutktur</a:t>
             </a:r>
             <a:r>
               <a:rPr lang="de-DE" dirty="0"/>
-              <a:t> spezifiziert sind.</a:t>
+              <a:t> und einem pom.xml</a:t>
             </a:r>
             <a:endParaRPr lang="en-CH" dirty="0"/>
           </a:p>
@@ -1006,7 +948,7 @@
     </p:spTree>
     <p:extLst>
       <p:ext uri="{BB962C8B-B14F-4D97-AF65-F5344CB8AC3E}">
-        <p14:creationId xmlns:p14="http://schemas.microsoft.com/office/powerpoint/2010/main" val="1041508430"/>
+        <p14:creationId xmlns:p14="http://schemas.microsoft.com/office/powerpoint/2010/main" val="104606311"/>
       </p:ext>
     </p:extLst>
   </p:cSld>
@@ -1061,16 +1003,36 @@
           <a:lstStyle/>
           <a:p>
             <a:r>
+              <a:rPr lang="de-DE" dirty="0" err="1"/>
+              <a:t>maven</a:t>
+            </a:r>
+            <a:r>
               <a:rPr lang="de-DE" dirty="0"/>
-              <a:t>Und das </a:t>
+              <a:t> holt dann die </a:t>
             </a:r>
             <a:r>
               <a:rPr lang="de-DE" dirty="0" err="1"/>
-              <a:t>projekt</a:t>
+              <a:t>dependencies</a:t>
             </a:r>
             <a:r>
               <a:rPr lang="de-DE" dirty="0"/>
-              <a:t> wird dann…</a:t>
+              <a:t> welche im </a:t>
+            </a:r>
+            <a:r>
+              <a:rPr lang="de-DE" dirty="0" err="1"/>
+              <a:t>pom</a:t>
+            </a:r>
+            <a:r>
+              <a:rPr lang="de-DE" dirty="0"/>
+              <a:t> </a:t>
+            </a:r>
+            <a:r>
+              <a:rPr lang="de-DE" dirty="0" err="1"/>
+              <a:t>xml</a:t>
+            </a:r>
+            <a:r>
+              <a:rPr lang="de-DE" dirty="0"/>
+              <a:t> spezifiziert sind.</a:t>
             </a:r>
             <a:endParaRPr lang="en-CH" dirty="0"/>
           </a:p>
@@ -1079,7 +1041,7 @@
     </p:spTree>
     <p:extLst>
       <p:ext uri="{BB962C8B-B14F-4D97-AF65-F5344CB8AC3E}">
-        <p14:creationId xmlns:p14="http://schemas.microsoft.com/office/powerpoint/2010/main" val="4075596759"/>
+        <p14:creationId xmlns:p14="http://schemas.microsoft.com/office/powerpoint/2010/main" val="1041508430"/>
       </p:ext>
     </p:extLst>
   </p:cSld>
@@ -1135,19 +1097,15 @@
           <a:p>
             <a:r>
               <a:rPr lang="de-DE" dirty="0"/>
-              <a:t>Mit </a:t>
+              <a:t>Und das </a:t>
             </a:r>
             <a:r>
               <a:rPr lang="de-DE" dirty="0" err="1"/>
-              <a:t>hilfe</a:t>
+              <a:t>projekt</a:t>
             </a:r>
             <a:r>
               <a:rPr lang="de-DE" dirty="0"/>
-              <a:t> von den im pom.xml spezifizierten </a:t>
-            </a:r>
-            <a:r>
-              <a:rPr lang="de-DE" dirty="0" err="1"/>
-              <a:t>plugins</a:t>
+              <a:t> wird dann…</a:t>
             </a:r>
             <a:endParaRPr lang="en-CH" dirty="0"/>
           </a:p>
@@ -1156,7 +1114,7 @@
     </p:spTree>
     <p:extLst>
       <p:ext uri="{BB962C8B-B14F-4D97-AF65-F5344CB8AC3E}">
-        <p14:creationId xmlns:p14="http://schemas.microsoft.com/office/powerpoint/2010/main" val="882073731"/>
+        <p14:creationId xmlns:p14="http://schemas.microsoft.com/office/powerpoint/2010/main" val="4075596759"/>
       </p:ext>
     </p:extLst>
   </p:cSld>
@@ -1211,28 +1169,20 @@
           <a:lstStyle/>
           <a:p>
             <a:r>
+              <a:rPr lang="de-DE" dirty="0"/>
+              <a:t>Mit </a:t>
+            </a:r>
+            <a:r>
               <a:rPr lang="de-DE" dirty="0" err="1"/>
-              <a:t>Compiled</a:t>
+              <a:t>hilfe</a:t>
             </a:r>
             <a:r>
               <a:rPr lang="de-DE" dirty="0"/>
-              <a:t> und bei bedarf sogar ein </a:t>
+              <a:t> von den im pom.xml spezifizierten </a:t>
             </a:r>
             <a:r>
               <a:rPr lang="de-DE" dirty="0" err="1"/>
-              <a:t>executable</a:t>
-            </a:r>
-            <a:r>
-              <a:rPr lang="de-DE" dirty="0"/>
-              <a:t> </a:t>
-            </a:r>
-            <a:r>
-              <a:rPr lang="de-DE" dirty="0" err="1"/>
-              <a:t>gebuildet</a:t>
-            </a:r>
-            <a:r>
-              <a:rPr lang="de-DE" dirty="0"/>
-              <a:t>.</a:t>
+              <a:t>plugins</a:t>
             </a:r>
             <a:endParaRPr lang="en-CH" dirty="0"/>
           </a:p>
@@ -1241,7 +1191,7 @@
     </p:spTree>
     <p:extLst>
       <p:ext uri="{BB962C8B-B14F-4D97-AF65-F5344CB8AC3E}">
-        <p14:creationId xmlns:p14="http://schemas.microsoft.com/office/powerpoint/2010/main" val="3367226476"/>
+        <p14:creationId xmlns:p14="http://schemas.microsoft.com/office/powerpoint/2010/main" val="882073731"/>
       </p:ext>
     </p:extLst>
   </p:cSld>
@@ -1295,6 +1245,91 @@
           <a:bodyPr/>
           <a:lstStyle/>
           <a:p>
+            <a:r>
+              <a:rPr lang="de-DE" dirty="0" err="1"/>
+              <a:t>Compiled</a:t>
+            </a:r>
+            <a:r>
+              <a:rPr lang="de-DE" dirty="0"/>
+              <a:t> und bei bedarf sogar ein </a:t>
+            </a:r>
+            <a:r>
+              <a:rPr lang="de-DE" dirty="0" err="1"/>
+              <a:t>executable</a:t>
+            </a:r>
+            <a:r>
+              <a:rPr lang="de-DE" dirty="0"/>
+              <a:t> </a:t>
+            </a:r>
+            <a:r>
+              <a:rPr lang="de-DE" dirty="0" err="1"/>
+              <a:t>gebuildet</a:t>
+            </a:r>
+            <a:r>
+              <a:rPr lang="de-DE" dirty="0"/>
+              <a:t>.</a:t>
+            </a:r>
+            <a:endParaRPr lang="en-CH" dirty="0"/>
+          </a:p>
+        </p:txBody>
+      </p:sp>
+    </p:spTree>
+    <p:extLst>
+      <p:ext uri="{BB962C8B-B14F-4D97-AF65-F5344CB8AC3E}">
+        <p14:creationId xmlns:p14="http://schemas.microsoft.com/office/powerpoint/2010/main" val="3367226476"/>
+      </p:ext>
+    </p:extLst>
+  </p:cSld>
+  <p:clrMapOvr>
+    <a:masterClrMapping/>
+  </p:clrMapOvr>
+</p:notes>
+</file>
+
+<file path=ppt/notesSlides/notesSlide18.xml><?xml version="1.0" encoding="utf-8"?>
+<p:notes xmlns:a="http://schemas.openxmlformats.org/drawingml/2006/main" xmlns:r="http://schemas.openxmlformats.org/officeDocument/2006/relationships" xmlns:p="http://schemas.openxmlformats.org/presentationml/2006/main">
+  <p:cSld>
+    <p:spTree>
+      <p:nvGrpSpPr>
+        <p:cNvPr id="1" name=""/>
+        <p:cNvGrpSpPr/>
+        <p:nvPr/>
+      </p:nvGrpSpPr>
+      <p:grpSpPr>
+        <a:xfrm>
+          <a:off x="0" y="0"/>
+          <a:ext cx="0" cy="0"/>
+          <a:chOff x="0" y="0"/>
+          <a:chExt cx="0" cy="0"/>
+        </a:xfrm>
+      </p:grpSpPr>
+      <p:sp>
+        <p:nvSpPr>
+          <p:cNvPr id="2" name="Folienbildplatzhalter 1"/>
+          <p:cNvSpPr>
+            <a:spLocks noGrp="1" noRot="1" noChangeAspect="1"/>
+          </p:cNvSpPr>
+          <p:nvPr>
+            <p:ph type="sldImg"/>
+          </p:nvPr>
+        </p:nvSpPr>
+        <p:spPr/>
+      </p:sp>
+      <p:sp>
+        <p:nvSpPr>
+          <p:cNvPr id="3" name="Notizenplatzhalter 2"/>
+          <p:cNvSpPr>
+            <a:spLocks noGrp="1"/>
+          </p:cNvSpPr>
+          <p:nvPr>
+            <p:ph type="body" idx="1"/>
+          </p:nvPr>
+        </p:nvSpPr>
+        <p:spPr/>
+        <p:txBody>
+          <a:bodyPr/>
+          <a:lstStyle/>
+          <a:p>
             <a:endParaRPr lang="en-CH" dirty="0"/>
           </a:p>
         </p:txBody>
@@ -1373,15 +1408,7 @@
           <a:p>
             <a:r>
               <a:rPr lang="de-DE" dirty="0"/>
-              <a:t>Eine der meines </a:t>
-            </a:r>
-            <a:r>
-              <a:rPr lang="de-DE" dirty="0" err="1"/>
-              <a:t>erachtens</a:t>
-            </a:r>
-            <a:r>
-              <a:rPr lang="de-DE" dirty="0"/>
-              <a:t> wichtigsten </a:t>
+              <a:t>Eine der coolsten und nützlichsten </a:t>
             </a:r>
             <a:r>
               <a:rPr lang="de-DE" dirty="0" err="1"/>
@@ -1688,22 +1715,6 @@
           <a:bodyPr/>
           <a:lstStyle/>
           <a:p>
-            <a:r>
-              <a:rPr lang="de-DE" dirty="0"/>
-              <a:t>Hier kommt </a:t>
-            </a:r>
-            <a:r>
-              <a:rPr lang="de-DE" dirty="0" err="1"/>
-              <a:t>maven</a:t>
-            </a:r>
-            <a:r>
-              <a:rPr lang="de-DE" dirty="0"/>
-              <a:t> ins spiel</a:t>
-            </a:r>
-            <a:r>
-              <a:rPr dirty="0"/>
-              <a:t>.</a:t>
-            </a:r>
             <a:endParaRPr lang="de-DE" dirty="0"/>
           </a:p>
           <a:p>
@@ -1780,29 +1791,6 @@
             <a:r>
               <a:rPr lang="de-DE" dirty="0" err="1"/>
               <a:t>dependencies</a:t>
-            </a:r>
-            <a:endParaRPr dirty="0"/>
-          </a:p>
-          <a:p>
-            <a:r>
-              <a:rPr lang="de-DE" dirty="0"/>
-              <a:t>- Das upgraden der </a:t>
-            </a:r>
-            <a:r>
-              <a:rPr lang="de-DE" dirty="0" err="1"/>
-              <a:t>dependencies</a:t>
-            </a:r>
-            <a:r>
-              <a:rPr lang="de-DE" dirty="0"/>
-              <a:t> ist easy ( nächste </a:t>
-            </a:r>
-            <a:r>
-              <a:rPr lang="de-DE" dirty="0" err="1"/>
-              <a:t>folie</a:t>
-            </a:r>
-            <a:r>
-              <a:rPr lang="de-DE" dirty="0"/>
-              <a:t>)</a:t>
             </a:r>
             <a:endParaRPr dirty="0"/>
           </a:p>
@@ -2031,7 +2019,29 @@
             </a:r>
             <a:r>
               <a:rPr lang="de-DE" dirty="0"/>
-              <a:t>. Sprich um die </a:t>
+              <a:t>. </a:t>
+            </a:r>
+          </a:p>
+          <a:p>
+            <a:r>
+              <a:rPr lang="de-DE" dirty="0"/>
+              <a:t>- Wie man hier sieht ist auch das anpassen der </a:t>
+            </a:r>
+            <a:r>
+              <a:rPr lang="de-DE" dirty="0" err="1"/>
+              <a:t>version</a:t>
+            </a:r>
+            <a:r>
+              <a:rPr lang="de-DE" dirty="0"/>
+              <a:t> einer </a:t>
+            </a:r>
+            <a:r>
+              <a:rPr lang="de-DE" dirty="0" err="1"/>
+              <a:t>dependency</a:t>
+            </a:r>
+            <a:r>
+              <a:rPr lang="de-DE" dirty="0"/>
+              <a:t> einfach: um die </a:t>
             </a:r>
             <a:r>
               <a:rPr lang="de-DE" dirty="0" err="1"/>
@@ -2090,7 +2100,7 @@
       </p:grpSpPr>
       <p:sp>
         <p:nvSpPr>
-          <p:cNvPr id="168" name="Shape 168"/>
+          <p:cNvPr id="141" name="Shape 141"/>
           <p:cNvSpPr>
             <a:spLocks noGrp="1" noRot="1" noChangeAspect="1"/>
           </p:cNvSpPr>
@@ -2113,7 +2123,7 @@
       </p:sp>
       <p:sp>
         <p:nvSpPr>
-          <p:cNvPr id="169" name="Shape 169"/>
+          <p:cNvPr id="142" name="Shape 142"/>
           <p:cNvSpPr>
             <a:spLocks noGrp="1"/>
           </p:cNvSpPr>
@@ -2131,147 +2141,88 @@
           <a:lstStyle/>
           <a:p>
             <a:r>
+              <a:rPr dirty="0"/>
+              <a:t>- IDEs also can build projects. But first, not all developers use the same IDE. You might use Eclipse, somebody else might use </a:t>
+            </a:r>
+            <a:r>
+              <a:rPr lang="de-DE" dirty="0" err="1"/>
+              <a:t>intellij</a:t>
+            </a:r>
+            <a:r>
+              <a:rPr dirty="0"/>
+              <a:t>. The idea is to abstract the build process from the</a:t>
+            </a:r>
+            <a:r>
               <a:rPr lang="de-DE" dirty="0"/>
-              <a:t>Maven benutzt </a:t>
+              <a:t> DIE</a:t>
+            </a:r>
+          </a:p>
+          <a:p>
+            <a:endParaRPr lang="de-DE" dirty="0"/>
+          </a:p>
+          <a:p>
+            <a:r>
+              <a:rPr lang="de-DE" dirty="0"/>
+              <a:t>- Maven verwendet </a:t>
             </a:r>
             <a:r>
               <a:rPr lang="de-DE" dirty="0" err="1"/>
-              <a:t>archetypes</a:t>
+              <a:t>plugins</a:t>
             </a:r>
             <a:r>
               <a:rPr lang="de-DE" dirty="0"/>
-              <a:t> um ein </a:t>
+              <a:t> welche dann ausgeführt werden um die Arbeit vom </a:t>
             </a:r>
             <a:r>
               <a:rPr lang="de-DE" dirty="0" err="1"/>
-              <a:t>projekt</a:t>
+              <a:t>user</a:t>
             </a:r>
             <a:r>
               <a:rPr lang="de-DE" dirty="0"/>
-              <a:t> zu erstellen.</a:t>
-            </a:r>
-          </a:p>
-          <a:p>
+              <a:t> abzunehmen. Beispielsweise zum </a:t>
+            </a:r>
             <a:r>
               <a:rPr lang="de-DE" dirty="0" err="1"/>
-              <a:t>Archetypes</a:t>
+              <a:t>compilen</a:t>
             </a:r>
             <a:r>
               <a:rPr lang="de-DE" dirty="0"/>
-              <a:t> sind eine </a:t>
+              <a:t> eines ganzen </a:t>
             </a:r>
             <a:r>
               <a:rPr lang="de-DE" dirty="0" err="1"/>
-              <a:t>art</a:t>
+              <a:t>projekts</a:t>
             </a:r>
             <a:r>
               <a:rPr lang="de-DE" dirty="0"/>
-              <a:t> </a:t>
+              <a:t>, zum </a:t>
             </a:r>
             <a:r>
               <a:rPr lang="de-DE" dirty="0" err="1"/>
-              <a:t>projekt</a:t>
+              <a:t>tests</a:t>
             </a:r>
             <a:r>
               <a:rPr lang="de-DE" dirty="0"/>
-              <a:t> </a:t>
+              <a:t> laufen lassen, um </a:t>
             </a:r>
             <a:r>
               <a:rPr lang="de-DE" dirty="0" err="1"/>
-              <a:t>templates</a:t>
-            </a:r>
-            <a:endParaRPr lang="de-DE" dirty="0"/>
-          </a:p>
-          <a:p>
+              <a:t>javadoc</a:t>
+            </a:r>
             <a:r>
               <a:rPr lang="de-DE" dirty="0"/>
-              <a:t>Im </a:t>
-            </a:r>
-            <a:r>
-              <a:rPr lang="de-DE" dirty="0" err="1"/>
-              <a:t>beispiel</a:t>
-            </a:r>
-            <a:r>
-              <a:rPr lang="de-DE" dirty="0"/>
-              <a:t> auf der </a:t>
-            </a:r>
-            <a:r>
-              <a:rPr lang="de-DE" dirty="0" err="1"/>
-              <a:t>folie</a:t>
-            </a:r>
-            <a:r>
-              <a:rPr lang="de-DE" dirty="0"/>
-              <a:t> wird ein </a:t>
-            </a:r>
-            <a:r>
-              <a:rPr lang="de-DE" dirty="0" err="1"/>
-              <a:t>projekt</a:t>
-            </a:r>
-            <a:r>
-              <a:rPr lang="de-DE" dirty="0"/>
-              <a:t> erstellt namens demo-</a:t>
-            </a:r>
-            <a:r>
-              <a:rPr lang="de-DE" dirty="0" err="1"/>
-              <a:t>app</a:t>
-            </a:r>
-            <a:r>
-              <a:rPr lang="de-DE" dirty="0"/>
-              <a:t> mit dem </a:t>
-            </a:r>
-            <a:r>
-              <a:rPr lang="de-DE" dirty="0" err="1"/>
-              <a:t>package</a:t>
-            </a:r>
-            <a:r>
-              <a:rPr lang="de-DE" dirty="0"/>
-              <a:t> </a:t>
-            </a:r>
-            <a:r>
-              <a:rPr lang="de-DE" dirty="0" err="1"/>
-              <a:t>namen</a:t>
-            </a:r>
-            <a:r>
-              <a:rPr lang="de-DE" dirty="0"/>
-              <a:t> </a:t>
-            </a:r>
-            <a:r>
-              <a:rPr lang="de-DE" dirty="0" err="1"/>
-              <a:t>ch.unibe.scg</a:t>
-            </a:r>
-            <a:r>
-              <a:rPr lang="de-DE" dirty="0"/>
-              <a:t> und das </a:t>
-            </a:r>
-            <a:r>
-              <a:rPr lang="de-DE" dirty="0" err="1"/>
-              <a:t>template</a:t>
-            </a:r>
-            <a:r>
-              <a:rPr lang="de-DE" dirty="0"/>
-              <a:t> das benutzt wird ist </a:t>
-            </a:r>
-            <a:r>
-              <a:rPr lang="de-DE" dirty="0" err="1"/>
-              <a:t>maven</a:t>
-            </a:r>
-            <a:r>
-              <a:rPr lang="de-DE" dirty="0"/>
-              <a:t>-archetype-</a:t>
-            </a:r>
-            <a:r>
-              <a:rPr lang="de-DE" dirty="0" err="1"/>
-              <a:t>quickstart</a:t>
-            </a:r>
-            <a:r>
-              <a:rPr lang="de-DE" dirty="0"/>
-              <a:t>.</a:t>
+              <a:t> zu bauen etc.</a:t>
             </a:r>
             <a:endParaRPr dirty="0"/>
           </a:p>
         </p:txBody>
       </p:sp>
     </p:spTree>
+    <p:extLst>
+      <p:ext uri="{BB962C8B-B14F-4D97-AF65-F5344CB8AC3E}">
+        <p14:creationId xmlns:p14="http://schemas.microsoft.com/office/powerpoint/2010/main" val="472125694"/>
+      </p:ext>
+    </p:extLst>
   </p:cSld>
   <p:clrMapOvr>
     <a:masterClrMapping/>
@@ -2298,7 +2249,7 @@
       </p:grpSpPr>
       <p:sp>
         <p:nvSpPr>
-          <p:cNvPr id="2" name="Folienbildplatzhalter 1"/>
+          <p:cNvPr id="168" name="Shape 168"/>
           <p:cNvSpPr>
             <a:spLocks noGrp="1" noRot="1" noChangeAspect="1"/>
           </p:cNvSpPr>
@@ -2306,34 +2257,180 @@
             <p:ph type="sldImg"/>
           </p:nvPr>
         </p:nvSpPr>
-        <p:spPr/>
+        <p:spPr>
+          <a:prstGeom prst="rect">
+            <a:avLst/>
+          </a:prstGeom>
+        </p:spPr>
+        <p:txBody>
+          <a:bodyPr/>
+          <a:lstStyle/>
+          <a:p>
+            <a:endParaRPr/>
+          </a:p>
+        </p:txBody>
       </p:sp>
       <p:sp>
         <p:nvSpPr>
-          <p:cNvPr id="3" name="Notizenplatzhalter 2"/>
+          <p:cNvPr id="169" name="Shape 169"/>
           <p:cNvSpPr>
             <a:spLocks noGrp="1"/>
           </p:cNvSpPr>
           <p:nvPr>
-            <p:ph type="body" idx="1"/>
+            <p:ph type="body" sz="quarter" idx="1"/>
           </p:nvPr>
         </p:nvSpPr>
-        <p:spPr/>
+        <p:spPr>
+          <a:prstGeom prst="rect">
+            <a:avLst/>
+          </a:prstGeom>
+        </p:spPr>
         <p:txBody>
           <a:bodyPr/>
           <a:lstStyle/>
           <a:p>
             <a:r>
               <a:rPr lang="de-DE" dirty="0"/>
-              <a:t>Es gibt verschiedene </a:t>
+              <a:t>- Maven erleichtert uns auch die </a:t>
             </a:r>
             <a:r>
               <a:rPr lang="de-DE" dirty="0" err="1"/>
-              <a:t>phasen</a:t>
+              <a:t>erstellung</a:t>
             </a:r>
             <a:r>
               <a:rPr lang="de-DE" dirty="0"/>
-              <a:t> in </a:t>
+              <a:t> eines neuen </a:t>
+            </a:r>
+            <a:r>
+              <a:rPr lang="de-DE" dirty="0" err="1"/>
+              <a:t>projektes</a:t>
+            </a:r>
+            <a:r>
+              <a:rPr lang="de-DE" dirty="0"/>
+              <a:t>:</a:t>
+            </a:r>
+          </a:p>
+          <a:p>
+            <a:r>
+              <a:rPr lang="de-DE" dirty="0"/>
+              <a:t>Maven benutzt </a:t>
+            </a:r>
+            <a:r>
+              <a:rPr lang="de-DE" dirty="0" err="1"/>
+              <a:t>archetypes</a:t>
+            </a:r>
+            <a:r>
+              <a:rPr lang="de-DE" dirty="0"/>
+              <a:t> um ein </a:t>
+            </a:r>
+            <a:r>
+              <a:rPr lang="de-DE" dirty="0" err="1"/>
+              <a:t>projekt</a:t>
+            </a:r>
+            <a:r>
+              <a:rPr lang="de-DE" dirty="0"/>
+              <a:t> zu erstellen.</a:t>
+            </a:r>
+          </a:p>
+          <a:p>
+            <a:r>
+              <a:rPr lang="de-DE" dirty="0" err="1"/>
+              <a:t>Archetypes</a:t>
+            </a:r>
+            <a:r>
+              <a:rPr lang="de-DE" dirty="0"/>
+              <a:t> sind eine </a:t>
+            </a:r>
+            <a:r>
+              <a:rPr lang="de-DE" dirty="0" err="1"/>
+              <a:t>art</a:t>
+            </a:r>
+            <a:r>
+              <a:rPr lang="de-DE" dirty="0"/>
+              <a:t> </a:t>
+            </a:r>
+            <a:r>
+              <a:rPr lang="de-DE" dirty="0" err="1"/>
+              <a:t>projekt</a:t>
+            </a:r>
+            <a:r>
+              <a:rPr lang="de-DE" dirty="0"/>
+              <a:t> </a:t>
+            </a:r>
+            <a:r>
+              <a:rPr lang="de-DE" dirty="0" err="1"/>
+              <a:t>templates</a:t>
+            </a:r>
+            <a:endParaRPr lang="de-DE" dirty="0"/>
+          </a:p>
+          <a:p>
+            <a:r>
+              <a:rPr lang="de-DE" dirty="0"/>
+              <a:t>Im </a:t>
+            </a:r>
+            <a:r>
+              <a:rPr lang="de-DE" dirty="0" err="1"/>
+              <a:t>beispiel</a:t>
+            </a:r>
+            <a:r>
+              <a:rPr lang="de-DE" dirty="0"/>
+              <a:t> auf der </a:t>
+            </a:r>
+            <a:r>
+              <a:rPr lang="de-DE" dirty="0" err="1"/>
+              <a:t>folie</a:t>
+            </a:r>
+            <a:r>
+              <a:rPr lang="de-DE" dirty="0"/>
+              <a:t> wird ein </a:t>
+            </a:r>
+            <a:r>
+              <a:rPr lang="de-DE" dirty="0" err="1"/>
+              <a:t>projekt</a:t>
+            </a:r>
+            <a:r>
+              <a:rPr lang="de-DE" dirty="0"/>
+              <a:t> erstellt namens demo-</a:t>
+            </a:r>
+            <a:r>
+              <a:rPr lang="de-DE" dirty="0" err="1"/>
+              <a:t>app</a:t>
+            </a:r>
+            <a:r>
+              <a:rPr lang="de-DE" dirty="0"/>
+              <a:t> mit dem </a:t>
+            </a:r>
+            <a:r>
+              <a:rPr lang="de-DE" dirty="0" err="1"/>
+              <a:t>package</a:t>
+            </a:r>
+            <a:r>
+              <a:rPr lang="de-DE" dirty="0"/>
+              <a:t> </a:t>
+            </a:r>
+            <a:r>
+              <a:rPr lang="de-DE" dirty="0" err="1"/>
+              <a:t>namen</a:t>
+            </a:r>
+            <a:r>
+              <a:rPr lang="de-DE" dirty="0"/>
+              <a:t> </a:t>
+            </a:r>
+            <a:r>
+              <a:rPr lang="de-DE" dirty="0" err="1"/>
+              <a:t>ch.unibe.scg</a:t>
+            </a:r>
+            <a:r>
+              <a:rPr lang="de-DE" dirty="0"/>
+              <a:t> und das </a:t>
+            </a:r>
+            <a:r>
+              <a:rPr lang="de-DE" dirty="0" err="1"/>
+              <a:t>template</a:t>
+            </a:r>
+            <a:r>
+              <a:rPr lang="de-DE" dirty="0"/>
+              <a:t> das benutzt wird ist </a:t>
             </a:r>
             <a:r>
               <a:rPr lang="de-DE" dirty="0" err="1"/>
@@ -2341,104 +2438,21 @@
             </a:r>
             <a:r>
               <a:rPr lang="de-DE" dirty="0"/>
-              <a:t>, welche uns </a:t>
+              <a:t>-archetype-</a:t>
             </a:r>
             <a:r>
               <a:rPr lang="de-DE" dirty="0" err="1"/>
-              <a:t>arbeit</a:t>
-            </a:r>
-            <a:r>
-              <a:rPr lang="de-DE" dirty="0"/>
-              <a:t> abnehmen. Dies sind ein par </a:t>
-            </a:r>
-            <a:r>
-              <a:rPr lang="de-DE" dirty="0" err="1"/>
-              <a:t>beispiele</a:t>
+              <a:t>quickstart</a:t>
             </a:r>
             <a:r>
               <a:rPr lang="de-DE" dirty="0"/>
               <a:t>.</a:t>
             </a:r>
-          </a:p>
-          <a:p>
-            <a:r>
-              <a:rPr lang="de-DE" dirty="0"/>
-              <a:t>Dies alles wird erreicht mit </a:t>
-            </a:r>
-            <a:r>
-              <a:rPr lang="de-DE" dirty="0" err="1"/>
-              <a:t>plugins</a:t>
-            </a:r>
-            <a:r>
-              <a:rPr lang="de-DE" dirty="0"/>
-              <a:t>. Im </a:t>
-            </a:r>
-            <a:r>
-              <a:rPr lang="de-DE" dirty="0" err="1"/>
-              <a:t>beispiel</a:t>
-            </a:r>
-            <a:r>
-              <a:rPr lang="de-DE" dirty="0"/>
-              <a:t> hier seht ihr </a:t>
-            </a:r>
-            <a:r>
-              <a:rPr lang="de-DE" dirty="0" err="1"/>
-              <a:t>plugins</a:t>
-            </a:r>
-            <a:r>
-              <a:rPr lang="de-DE" dirty="0"/>
-              <a:t> wie </a:t>
-            </a:r>
-            <a:r>
-              <a:rPr lang="de-DE" dirty="0" err="1"/>
-              <a:t>compile</a:t>
-            </a:r>
-            <a:r>
-              <a:rPr lang="de-DE" dirty="0"/>
-              <a:t>, </a:t>
-            </a:r>
-            <a:r>
-              <a:rPr lang="de-DE" dirty="0" err="1"/>
-              <a:t>test</a:t>
-            </a:r>
-            <a:r>
-              <a:rPr lang="de-DE" dirty="0"/>
-              <a:t> und </a:t>
-            </a:r>
-            <a:r>
-              <a:rPr lang="de-DE" dirty="0" err="1"/>
-              <a:t>package</a:t>
-            </a:r>
-            <a:r>
-              <a:rPr lang="de-DE" dirty="0"/>
-              <a:t>, welche bereits von </a:t>
-            </a:r>
-            <a:r>
-              <a:rPr lang="de-DE" dirty="0" err="1"/>
-              <a:t>maven</a:t>
-            </a:r>
-            <a:r>
-              <a:rPr lang="de-DE" dirty="0"/>
-              <a:t> von </a:t>
-            </a:r>
-            <a:r>
-              <a:rPr lang="de-DE" dirty="0" err="1"/>
-              <a:t>grund</a:t>
-            </a:r>
-            <a:r>
-              <a:rPr lang="de-DE" dirty="0"/>
-              <a:t> auf unterstützt werden.</a:t>
-            </a:r>
-            <a:endParaRPr lang="en-CH" dirty="0"/>
+            <a:endParaRPr dirty="0"/>
           </a:p>
         </p:txBody>
       </p:sp>
     </p:spTree>
-    <p:extLst>
-      <p:ext uri="{BB962C8B-B14F-4D97-AF65-F5344CB8AC3E}">
-        <p14:creationId xmlns:p14="http://schemas.microsoft.com/office/powerpoint/2010/main" val="1863504515"/>
-      </p:ext>
-    </p:extLst>
   </p:cSld>
   <p:clrMapOvr>
     <a:masterClrMapping/>
@@ -2490,26 +2504,200 @@
           <a:bodyPr/>
           <a:lstStyle/>
           <a:p>
+            <a:pPr marL="342900" indent="-342900">
+              <a:buFontTx/>
+              <a:buChar char="-"/>
+            </a:pPr>
             <a:r>
               <a:rPr lang="de-DE" dirty="0"/>
-              <a:t>Man kann auch weitere </a:t>
+              <a:t>Maven erleichtert uns nicht nur die </a:t>
             </a:r>
             <a:r>
               <a:rPr lang="de-DE" dirty="0" err="1"/>
-              <a:t>plugnis</a:t>
+              <a:t>erstellung</a:t>
             </a:r>
             <a:r>
               <a:rPr lang="de-DE" dirty="0"/>
-              <a:t> hinzufügen</a:t>
-            </a:r>
-            <a:endParaRPr lang="en-CH" dirty="0"/>
+              <a:t> eines </a:t>
+            </a:r>
+            <a:r>
+              <a:rPr lang="de-DE" dirty="0" err="1"/>
+              <a:t>projektes</a:t>
+            </a:r>
+            <a:endParaRPr lang="de-DE" dirty="0"/>
+          </a:p>
+          <a:p>
+            <a:pPr marL="342900" indent="-342900">
+              <a:buFontTx/>
+              <a:buChar char="-"/>
+            </a:pPr>
+            <a:r>
+              <a:rPr lang="de-DE" dirty="0"/>
+              <a:t>Wir haben bei </a:t>
+            </a:r>
+            <a:r>
+              <a:rPr lang="de-DE" dirty="0" err="1"/>
+              <a:t>maven</a:t>
+            </a:r>
+            <a:r>
+              <a:rPr lang="de-DE" dirty="0"/>
+              <a:t>, die </a:t>
+            </a:r>
+            <a:r>
+              <a:rPr lang="de-DE" dirty="0" err="1"/>
+              <a:t>möglichkeit</a:t>
+            </a:r>
+            <a:r>
+              <a:rPr lang="de-DE" dirty="0"/>
+              <a:t> verschiedene </a:t>
+            </a:r>
+            <a:r>
+              <a:rPr lang="de-DE" dirty="0" err="1"/>
+              <a:t>plugins</a:t>
+            </a:r>
+            <a:r>
+              <a:rPr lang="de-DE" dirty="0"/>
+              <a:t> auszuführen welche für uns den ganzen </a:t>
+            </a:r>
+            <a:r>
+              <a:rPr lang="de-DE" dirty="0" err="1"/>
+              <a:t>build</a:t>
+            </a:r>
+            <a:r>
+              <a:rPr lang="de-DE" dirty="0"/>
+              <a:t> </a:t>
+            </a:r>
+            <a:r>
+              <a:rPr lang="de-DE" dirty="0" err="1"/>
+              <a:t>prozess</a:t>
+            </a:r>
+            <a:r>
+              <a:rPr lang="de-DE" dirty="0"/>
+              <a:t> eines </a:t>
+            </a:r>
+            <a:r>
+              <a:rPr lang="de-DE" dirty="0" err="1"/>
+              <a:t>programms</a:t>
+            </a:r>
+            <a:r>
+              <a:rPr lang="de-DE" dirty="0"/>
+              <a:t> automatisieren. </a:t>
+            </a:r>
+          </a:p>
+          <a:p>
+            <a:pPr marL="342900" indent="-342900">
+              <a:buFontTx/>
+              <a:buChar char="-"/>
+            </a:pPr>
+            <a:r>
+              <a:rPr lang="de-DE" dirty="0"/>
+              <a:t>Im </a:t>
+            </a:r>
+            <a:r>
+              <a:rPr lang="de-DE" dirty="0" err="1"/>
+              <a:t>beispiel</a:t>
+            </a:r>
+            <a:r>
+              <a:rPr lang="de-DE" dirty="0"/>
+              <a:t> hier wird im rahmen des </a:t>
+            </a:r>
+            <a:r>
+              <a:rPr lang="de-DE" dirty="0" err="1"/>
+              <a:t>build</a:t>
+            </a:r>
+            <a:r>
+              <a:rPr lang="de-DE" dirty="0"/>
+              <a:t> </a:t>
+            </a:r>
+            <a:r>
+              <a:rPr lang="de-DE" dirty="0" err="1"/>
+              <a:t>prozesses</a:t>
+            </a:r>
+            <a:r>
+              <a:rPr lang="de-DE" dirty="0"/>
+              <a:t> das </a:t>
+            </a:r>
+            <a:r>
+              <a:rPr lang="de-DE" dirty="0" err="1"/>
+              <a:t>projekt</a:t>
+            </a:r>
+            <a:r>
+              <a:rPr lang="de-DE" dirty="0"/>
+              <a:t> </a:t>
+            </a:r>
+            <a:r>
+              <a:rPr lang="de-DE" dirty="0" err="1"/>
+              <a:t>compiled</a:t>
+            </a:r>
+            <a:r>
+              <a:rPr lang="de-DE" dirty="0"/>
+              <a:t>, die </a:t>
+            </a:r>
+            <a:r>
+              <a:rPr lang="de-DE" dirty="0" err="1"/>
+              <a:t>tests</a:t>
+            </a:r>
+            <a:r>
+              <a:rPr lang="de-DE" dirty="0"/>
+              <a:t> ausgeführt und dann ein </a:t>
+            </a:r>
+            <a:r>
+              <a:rPr lang="de-DE" dirty="0" err="1"/>
+              <a:t>executable</a:t>
+            </a:r>
+            <a:r>
+              <a:rPr lang="de-DE" dirty="0"/>
+              <a:t> </a:t>
+            </a:r>
+            <a:r>
+              <a:rPr lang="de-DE" dirty="0" err="1"/>
+              <a:t>jar</a:t>
+            </a:r>
+            <a:r>
+              <a:rPr lang="de-DE" dirty="0"/>
+              <a:t>/ war gebaut.</a:t>
+            </a:r>
+          </a:p>
+          <a:p>
+            <a:pPr marL="342900" indent="-342900">
+              <a:buFontTx/>
+              <a:buChar char="-"/>
+            </a:pPr>
+            <a:r>
+              <a:rPr lang="de-DE" dirty="0"/>
+              <a:t>Es können beliebig weitere </a:t>
+            </a:r>
+            <a:r>
+              <a:rPr lang="de-DE" dirty="0" err="1"/>
+              <a:t>plugins</a:t>
+            </a:r>
+            <a:r>
+              <a:rPr lang="de-DE" dirty="0"/>
+              <a:t> in diesen </a:t>
+            </a:r>
+            <a:r>
+              <a:rPr lang="de-DE" dirty="0" err="1"/>
+              <a:t>build</a:t>
+            </a:r>
+            <a:r>
+              <a:rPr lang="de-DE" dirty="0"/>
+              <a:t> </a:t>
+            </a:r>
+            <a:r>
+              <a:rPr lang="de-DE" dirty="0" err="1"/>
+              <a:t>prozess</a:t>
+            </a:r>
+            <a:r>
+              <a:rPr lang="de-DE" dirty="0"/>
+              <a:t> eingeschaltet werden.</a:t>
+            </a:r>
           </a:p>
         </p:txBody>
       </p:sp>
     </p:spTree>
     <p:extLst>
       <p:ext uri="{BB962C8B-B14F-4D97-AF65-F5344CB8AC3E}">
-        <p14:creationId xmlns:p14="http://schemas.microsoft.com/office/powerpoint/2010/main" val="1739666193"/>
+        <p14:creationId xmlns:p14="http://schemas.microsoft.com/office/powerpoint/2010/main" val="1863504515"/>
       </p:ext>
     </p:extLst>
   </p:cSld>
@@ -4146,7 +4334,7 @@
           </a:ln>
           <a:extLst>
             <a:ext uri="{C572A759-6A51-4108-AA02-DFA0A04FC94B}">
-              <ma14:wrappingTextBoxFlag xmlns:ma14="http://schemas.microsoft.com/office/mac/drawingml/2011/main" xmlns="" val="1"/>
+              <ma14:wrappingTextBoxFlag xmlns="" xmlns:ma14="http://schemas.microsoft.com/office/mac/drawingml/2011/main" val="1"/>
             </a:ext>
           </a:extLst>
         </p:spPr>
@@ -4185,7 +4373,7 @@
           </a:ln>
           <a:extLst>
             <a:ext uri="{C572A759-6A51-4108-AA02-DFA0A04FC94B}">
-              <ma14:wrappingTextBoxFlag xmlns:ma14="http://schemas.microsoft.com/office/mac/drawingml/2011/main" xmlns="" val="1"/>
+              <ma14:wrappingTextBoxFlag xmlns="" xmlns:ma14="http://schemas.microsoft.com/office/mac/drawingml/2011/main" val="1"/>
             </a:ext>
           </a:extLst>
         </p:spPr>
@@ -5128,6 +5316,23 @@
               </a:defRPr>
             </a:pPr>
             <a:r>
+              <a:rPr lang="de-DE" dirty="0" err="1"/>
+              <a:t>Slides</a:t>
+            </a:r>
+            <a:r>
+              <a:rPr lang="de-DE" dirty="0"/>
+              <a:t> </a:t>
+            </a:r>
+            <a:r>
+              <a:rPr lang="de-DE" dirty="0" err="1"/>
+              <a:t>by</a:t>
+            </a:r>
+            <a:r>
+              <a:rPr lang="de-DE" dirty="0"/>
+              <a:t>: </a:t>
+            </a:r>
+            <a:r>
+              <a:rPr dirty="0"/>
               <a:t>Haidar Osman</a:t>
             </a:r>
           </a:p>
@@ -5144,8 +5349,8 @@
               </a:defRPr>
             </a:pPr>
             <a:r>
-              <a:rPr u="sng">
-                <a:hlinkClick r:id="rId2"/>
+              <a:rPr u="sng" dirty="0">
+                <a:hlinkClick r:id="rId3"/>
               </a:rPr>
               <a:t>http://scg.unibe.ch/staff/Osman</a:t>
             </a:r>
@@ -5161,7 +5366,7 @@
           <p:nvPr/>
         </p:nvPicPr>
         <p:blipFill>
-          <a:blip r:embed="rId3">
+          <a:blip r:embed="rId4">
             <a:extLst/>
           </a:blip>
           <a:stretch>
@@ -5200,7 +5405,7 @@
           </a:ln>
           <a:extLst>
             <a:ext uri="{C572A759-6A51-4108-AA02-DFA0A04FC94B}">
-              <ma14:wrappingTextBoxFlag xmlns:ma14="http://schemas.microsoft.com/office/mac/drawingml/2011/main" xmlns="" val="1"/>
+              <ma14:wrappingTextBoxFlag xmlns="" xmlns:ma14="http://schemas.microsoft.com/office/mac/drawingml/2011/main" val="1"/>
             </a:ext>
           </a:extLst>
         </p:spPr>
@@ -5220,8 +5425,14 @@
           </a:lstStyle>
           <a:p>
             <a:r>
-              <a:t>ESE 2016</a:t>
-            </a:r>
+              <a:rPr dirty="0"/>
+              <a:t>ESE 201</a:t>
+            </a:r>
+            <a:r>
+              <a:rPr lang="de-DE" dirty="0"/>
+              <a:t>7</a:t>
+            </a:r>
+            <a:endParaRPr dirty="0"/>
           </a:p>
         </p:txBody>
       </p:sp>
@@ -5234,7 +5445,7 @@
           <p:nvPr/>
         </p:nvPicPr>
         <p:blipFill>
-          <a:blip r:embed="rId4">
+          <a:blip r:embed="rId5">
             <a:extLst/>
           </a:blip>
           <a:stretch>
@@ -5300,8 +5511,22 @@
           <a:lstStyle/>
           <a:p>
             <a:r>
-              <a:t>Maven Phases</a:t>
-            </a:r>
+              <a:rPr dirty="0"/>
+              <a:t>Maven </a:t>
+            </a:r>
+            <a:r>
+              <a:rPr lang="de-DE" dirty="0" err="1"/>
+              <a:t>Build</a:t>
+            </a:r>
+            <a:r>
+              <a:rPr lang="de-DE" dirty="0"/>
+              <a:t> </a:t>
+            </a:r>
+            <a:r>
+              <a:rPr lang="de-DE" dirty="0" err="1"/>
+              <a:t>process</a:t>
+            </a:r>
+            <a:endParaRPr dirty="0"/>
           </a:p>
         </p:txBody>
       </p:sp>
@@ -5461,7 +5686,7 @@
               <a:effectLst/>
               <a:extLst>
                 <a:ext uri="{C572A759-6A51-4108-AA02-DFA0A04FC94B}">
-                  <ma14:wrappingTextBoxFlag xmlns:ma14="http://schemas.microsoft.com/office/mac/drawingml/2011/main" xmlns="" val="1"/>
+                  <ma14:wrappingTextBoxFlag xmlns="" xmlns:ma14="http://schemas.microsoft.com/office/mac/drawingml/2011/main" val="1"/>
                 </a:ext>
               </a:extLst>
             </p:spPr>
@@ -5620,7 +5845,7 @@
                 <a:effectLst/>
                 <a:extLst>
                   <a:ext uri="{C572A759-6A51-4108-AA02-DFA0A04FC94B}">
-                    <ma14:wrappingTextBoxFlag xmlns:ma14="http://schemas.microsoft.com/office/mac/drawingml/2011/main" xmlns="" val="1"/>
+                    <ma14:wrappingTextBoxFlag xmlns="" xmlns:ma14="http://schemas.microsoft.com/office/mac/drawingml/2011/main" val="1"/>
                   </a:ext>
                 </a:extLst>
               </p:spPr>
@@ -5818,7 +6043,7 @@
                 <a:effectLst/>
                 <a:extLst>
                   <a:ext uri="{C572A759-6A51-4108-AA02-DFA0A04FC94B}">
-                    <ma14:wrappingTextBoxFlag xmlns:ma14="http://schemas.microsoft.com/office/mac/drawingml/2011/main" xmlns="" val="1"/>
+                    <ma14:wrappingTextBoxFlag xmlns="" xmlns:ma14="http://schemas.microsoft.com/office/mac/drawingml/2011/main" val="1"/>
                   </a:ext>
                 </a:extLst>
               </p:spPr>
@@ -5905,7 +6130,7 @@
             <a:effectLst/>
             <a:extLst>
               <a:ext uri="{C572A759-6A51-4108-AA02-DFA0A04FC94B}">
-                <ma14:wrappingTextBoxFlag xmlns:ma14="http://schemas.microsoft.com/office/mac/drawingml/2011/main" xmlns="" val="1"/>
+                <ma14:wrappingTextBoxFlag xmlns="" xmlns:ma14="http://schemas.microsoft.com/office/mac/drawingml/2011/main" val="1"/>
               </a:ext>
             </a:extLst>
           </p:spPr>
@@ -5952,7 +6177,7 @@
             <a:effectLst/>
             <a:extLst>
               <a:ext uri="{C572A759-6A51-4108-AA02-DFA0A04FC94B}">
-                <ma14:wrappingTextBoxFlag xmlns:ma14="http://schemas.microsoft.com/office/mac/drawingml/2011/main" xmlns="" val="1"/>
+                <ma14:wrappingTextBoxFlag xmlns="" xmlns:ma14="http://schemas.microsoft.com/office/mac/drawingml/2011/main" val="1"/>
               </a:ext>
             </a:extLst>
           </p:spPr>
@@ -6136,7 +6361,7 @@
           </a:ln>
           <a:extLst>
             <a:ext uri="{C572A759-6A51-4108-AA02-DFA0A04FC94B}">
-              <ma14:wrappingTextBoxFlag xmlns:ma14="http://schemas.microsoft.com/office/mac/drawingml/2011/main" xmlns="" val="1"/>
+              <ma14:wrappingTextBoxFlag xmlns="" xmlns:ma14="http://schemas.microsoft.com/office/mac/drawingml/2011/main" val="1"/>
             </a:ext>
           </a:extLst>
         </p:spPr>
@@ -6198,7 +6423,7 @@
           </a:ln>
           <a:extLst>
             <a:ext uri="{C572A759-6A51-4108-AA02-DFA0A04FC94B}">
-              <ma14:wrappingTextBoxFlag xmlns:ma14="http://schemas.microsoft.com/office/mac/drawingml/2011/main" xmlns="" val="1"/>
+              <ma14:wrappingTextBoxFlag xmlns="" xmlns:ma14="http://schemas.microsoft.com/office/mac/drawingml/2011/main" val="1"/>
             </a:ext>
           </a:extLst>
         </p:spPr>
@@ -6287,7 +6512,7 @@
           </a:ln>
           <a:extLst>
             <a:ext uri="{C572A759-6A51-4108-AA02-DFA0A04FC94B}">
-              <ma14:wrappingTextBoxFlag xmlns:ma14="http://schemas.microsoft.com/office/mac/drawingml/2011/main" xmlns="" val="1"/>
+              <ma14:wrappingTextBoxFlag xmlns="" xmlns:ma14="http://schemas.microsoft.com/office/mac/drawingml/2011/main" val="1"/>
             </a:ext>
           </a:extLst>
         </p:spPr>
@@ -6431,7 +6656,7 @@
             <a:effectLst/>
             <a:extLst>
               <a:ext uri="{C572A759-6A51-4108-AA02-DFA0A04FC94B}">
-                <ma14:wrappingTextBoxFlag xmlns:ma14="http://schemas.microsoft.com/office/mac/drawingml/2011/main" xmlns="" val="1"/>
+                <ma14:wrappingTextBoxFlag xmlns="" xmlns:ma14="http://schemas.microsoft.com/office/mac/drawingml/2011/main" val="1"/>
               </a:ext>
             </a:extLst>
           </p:spPr>
@@ -6545,7 +6770,7 @@
             <a:effectLst/>
             <a:extLst>
               <a:ext uri="{C572A759-6A51-4108-AA02-DFA0A04FC94B}">
-                <ma14:wrappingTextBoxFlag xmlns:ma14="http://schemas.microsoft.com/office/mac/drawingml/2011/main" xmlns="" val="1"/>
+                <ma14:wrappingTextBoxFlag xmlns="" xmlns:ma14="http://schemas.microsoft.com/office/mac/drawingml/2011/main" val="1"/>
               </a:ext>
             </a:extLst>
           </p:spPr>
@@ -6640,7 +6865,7 @@
             <a:effectLst/>
             <a:extLst>
               <a:ext uri="{C572A759-6A51-4108-AA02-DFA0A04FC94B}">
-                <ma14:wrappingTextBoxFlag xmlns:ma14="http://schemas.microsoft.com/office/mac/drawingml/2011/main" xmlns="" val="1"/>
+                <ma14:wrappingTextBoxFlag xmlns="" xmlns:ma14="http://schemas.microsoft.com/office/mac/drawingml/2011/main" val="1"/>
               </a:ext>
             </a:extLst>
           </p:spPr>
@@ -6706,7 +6931,7 @@
               <a:effectLst/>
               <a:extLst>
                 <a:ext uri="{C572A759-6A51-4108-AA02-DFA0A04FC94B}">
-                  <ma14:wrappingTextBoxFlag xmlns:ma14="http://schemas.microsoft.com/office/mac/drawingml/2011/main" xmlns="" val="1"/>
+                  <ma14:wrappingTextBoxFlag xmlns="" xmlns:ma14="http://schemas.microsoft.com/office/mac/drawingml/2011/main" val="1"/>
                 </a:ext>
               </a:extLst>
             </p:spPr>
@@ -6755,7 +6980,7 @@
               <a:effectLst/>
               <a:extLst>
                 <a:ext uri="{C572A759-6A51-4108-AA02-DFA0A04FC94B}">
-                  <ma14:wrappingTextBoxFlag xmlns:ma14="http://schemas.microsoft.com/office/mac/drawingml/2011/main" xmlns="" val="1"/>
+                  <ma14:wrappingTextBoxFlag xmlns="" xmlns:ma14="http://schemas.microsoft.com/office/mac/drawingml/2011/main" val="1"/>
                 </a:ext>
               </a:extLst>
             </p:spPr>
@@ -6838,7 +7063,7 @@
           </a:ln>
           <a:extLst>
             <a:ext uri="{C572A759-6A51-4108-AA02-DFA0A04FC94B}">
-              <ma14:wrappingTextBoxFlag xmlns:ma14="http://schemas.microsoft.com/office/mac/drawingml/2011/main" xmlns="" val="1"/>
+              <ma14:wrappingTextBoxFlag xmlns="" xmlns:ma14="http://schemas.microsoft.com/office/mac/drawingml/2011/main" val="1"/>
             </a:ext>
           </a:extLst>
         </p:spPr>
@@ -6919,7 +7144,7 @@
             <a:effectLst/>
             <a:extLst>
               <a:ext uri="{C572A759-6A51-4108-AA02-DFA0A04FC94B}">
-                <ma14:wrappingTextBoxFlag xmlns:ma14="http://schemas.microsoft.com/office/mac/drawingml/2011/main" xmlns="" val="1"/>
+                <ma14:wrappingTextBoxFlag xmlns="" xmlns:ma14="http://schemas.microsoft.com/office/mac/drawingml/2011/main" val="1"/>
               </a:ext>
             </a:extLst>
           </p:spPr>
@@ -7014,7 +7239,7 @@
             <a:effectLst/>
             <a:extLst>
               <a:ext uri="{C572A759-6A51-4108-AA02-DFA0A04FC94B}">
-                <ma14:wrappingTextBoxFlag xmlns:ma14="http://schemas.microsoft.com/office/mac/drawingml/2011/main" xmlns="" val="1"/>
+                <ma14:wrappingTextBoxFlag xmlns="" xmlns:ma14="http://schemas.microsoft.com/office/mac/drawingml/2011/main" val="1"/>
               </a:ext>
             </a:extLst>
           </p:spPr>
@@ -7080,7 +7305,7 @@
               <a:effectLst/>
               <a:extLst>
                 <a:ext uri="{C572A759-6A51-4108-AA02-DFA0A04FC94B}">
-                  <ma14:wrappingTextBoxFlag xmlns:ma14="http://schemas.microsoft.com/office/mac/drawingml/2011/main" xmlns="" val="1"/>
+                  <ma14:wrappingTextBoxFlag xmlns="" xmlns:ma14="http://schemas.microsoft.com/office/mac/drawingml/2011/main" val="1"/>
                 </a:ext>
               </a:extLst>
             </p:spPr>
@@ -7129,7 +7354,7 @@
               <a:effectLst/>
               <a:extLst>
                 <a:ext uri="{C572A759-6A51-4108-AA02-DFA0A04FC94B}">
-                  <ma14:wrappingTextBoxFlag xmlns:ma14="http://schemas.microsoft.com/office/mac/drawingml/2011/main" xmlns="" val="1"/>
+                  <ma14:wrappingTextBoxFlag xmlns="" xmlns:ma14="http://schemas.microsoft.com/office/mac/drawingml/2011/main" val="1"/>
                 </a:ext>
               </a:extLst>
             </p:spPr>
@@ -7212,7 +7437,7 @@
           </a:ln>
           <a:extLst>
             <a:ext uri="{C572A759-6A51-4108-AA02-DFA0A04FC94B}">
-              <ma14:wrappingTextBoxFlag xmlns:ma14="http://schemas.microsoft.com/office/mac/drawingml/2011/main" xmlns="" val="1"/>
+              <ma14:wrappingTextBoxFlag xmlns="" xmlns:ma14="http://schemas.microsoft.com/office/mac/drawingml/2011/main" val="1"/>
             </a:ext>
           </a:extLst>
         </p:spPr>
@@ -7289,7 +7514,7 @@
           </a:ln>
           <a:extLst>
             <a:ext uri="{C572A759-6A51-4108-AA02-DFA0A04FC94B}">
-              <ma14:wrappingTextBoxFlag xmlns:ma14="http://schemas.microsoft.com/office/mac/drawingml/2011/main" xmlns="" val="1"/>
+              <ma14:wrappingTextBoxFlag xmlns="" xmlns:ma14="http://schemas.microsoft.com/office/mac/drawingml/2011/main" val="1"/>
             </a:ext>
           </a:extLst>
         </p:spPr>
@@ -7571,7 +7796,7 @@
             <a:effectLst/>
             <a:extLst>
               <a:ext uri="{C572A759-6A51-4108-AA02-DFA0A04FC94B}">
-                <ma14:wrappingTextBoxFlag xmlns:ma14="http://schemas.microsoft.com/office/mac/drawingml/2011/main" xmlns="" val="1"/>
+                <ma14:wrappingTextBoxFlag xmlns="" xmlns:ma14="http://schemas.microsoft.com/office/mac/drawingml/2011/main" val="1"/>
               </a:ext>
             </a:extLst>
           </p:spPr>
@@ -7680,7 +7905,7 @@
               <a:effectLst/>
               <a:extLst>
                 <a:ext uri="{C572A759-6A51-4108-AA02-DFA0A04FC94B}">
-                  <ma14:wrappingTextBoxFlag xmlns:ma14="http://schemas.microsoft.com/office/mac/drawingml/2011/main" xmlns="" val="1"/>
+                  <ma14:wrappingTextBoxFlag xmlns="" xmlns:ma14="http://schemas.microsoft.com/office/mac/drawingml/2011/main" val="1"/>
                 </a:ext>
               </a:extLst>
             </p:spPr>
@@ -7746,7 +7971,7 @@
                 <a:effectLst/>
                 <a:extLst>
                   <a:ext uri="{C572A759-6A51-4108-AA02-DFA0A04FC94B}">
-                    <ma14:wrappingTextBoxFlag xmlns:ma14="http://schemas.microsoft.com/office/mac/drawingml/2011/main" xmlns="" val="1"/>
+                    <ma14:wrappingTextBoxFlag xmlns="" xmlns:ma14="http://schemas.microsoft.com/office/mac/drawingml/2011/main" val="1"/>
                   </a:ext>
                 </a:extLst>
               </p:spPr>
@@ -7795,7 +8020,7 @@
                 <a:effectLst/>
                 <a:extLst>
                   <a:ext uri="{C572A759-6A51-4108-AA02-DFA0A04FC94B}">
-                    <ma14:wrappingTextBoxFlag xmlns:ma14="http://schemas.microsoft.com/office/mac/drawingml/2011/main" xmlns="" val="1"/>
+                    <ma14:wrappingTextBoxFlag xmlns="" xmlns:ma14="http://schemas.microsoft.com/office/mac/drawingml/2011/main" val="1"/>
                   </a:ext>
                 </a:extLst>
               </p:spPr>
@@ -7844,7 +8069,7 @@
             <a:effectLst/>
             <a:extLst>
               <a:ext uri="{C572A759-6A51-4108-AA02-DFA0A04FC94B}">
-                <ma14:wrappingTextBoxFlag xmlns:ma14="http://schemas.microsoft.com/office/mac/drawingml/2011/main" xmlns="" val="1"/>
+                <ma14:wrappingTextBoxFlag xmlns="" xmlns:ma14="http://schemas.microsoft.com/office/mac/drawingml/2011/main" val="1"/>
               </a:ext>
             </a:extLst>
           </p:spPr>
@@ -8726,7 +8951,7 @@
           </a:ln>
           <a:extLst>
             <a:ext uri="{C572A759-6A51-4108-AA02-DFA0A04FC94B}">
-              <ma14:wrappingTextBoxFlag xmlns:ma14="http://schemas.microsoft.com/office/mac/drawingml/2011/main" xmlns="" val="1"/>
+              <ma14:wrappingTextBoxFlag xmlns="" xmlns:ma14="http://schemas.microsoft.com/office/mac/drawingml/2011/main" val="1"/>
             </a:ext>
           </a:extLst>
         </p:spPr>
@@ -8803,7 +9028,7 @@
           </a:ln>
           <a:extLst>
             <a:ext uri="{C572A759-6A51-4108-AA02-DFA0A04FC94B}">
-              <ma14:wrappingTextBoxFlag xmlns:ma14="http://schemas.microsoft.com/office/mac/drawingml/2011/main" xmlns="" val="1"/>
+              <ma14:wrappingTextBoxFlag xmlns="" xmlns:ma14="http://schemas.microsoft.com/office/mac/drawingml/2011/main" val="1"/>
             </a:ext>
           </a:extLst>
         </p:spPr>
@@ -9085,7 +9310,7 @@
             <a:effectLst/>
             <a:extLst>
               <a:ext uri="{C572A759-6A51-4108-AA02-DFA0A04FC94B}">
-                <ma14:wrappingTextBoxFlag xmlns:ma14="http://schemas.microsoft.com/office/mac/drawingml/2011/main" xmlns="" val="1"/>
+                <ma14:wrappingTextBoxFlag xmlns="" xmlns:ma14="http://schemas.microsoft.com/office/mac/drawingml/2011/main" val="1"/>
               </a:ext>
             </a:extLst>
           </p:spPr>
@@ -9194,7 +9419,7 @@
               <a:effectLst/>
               <a:extLst>
                 <a:ext uri="{C572A759-6A51-4108-AA02-DFA0A04FC94B}">
-                  <ma14:wrappingTextBoxFlag xmlns:ma14="http://schemas.microsoft.com/office/mac/drawingml/2011/main" xmlns="" val="1"/>
+                  <ma14:wrappingTextBoxFlag xmlns="" xmlns:ma14="http://schemas.microsoft.com/office/mac/drawingml/2011/main" val="1"/>
                 </a:ext>
               </a:extLst>
             </p:spPr>
@@ -9260,7 +9485,7 @@
                 <a:effectLst/>
                 <a:extLst>
                   <a:ext uri="{C572A759-6A51-4108-AA02-DFA0A04FC94B}">
-                    <ma14:wrappingTextBoxFlag xmlns:ma14="http://schemas.microsoft.com/office/mac/drawingml/2011/main" xmlns="" val="1"/>
+                    <ma14:wrappingTextBoxFlag xmlns="" xmlns:ma14="http://schemas.microsoft.com/office/mac/drawingml/2011/main" val="1"/>
                   </a:ext>
                 </a:extLst>
               </p:spPr>
@@ -9309,7 +9534,7 @@
                 <a:effectLst/>
                 <a:extLst>
                   <a:ext uri="{C572A759-6A51-4108-AA02-DFA0A04FC94B}">
-                    <ma14:wrappingTextBoxFlag xmlns:ma14="http://schemas.microsoft.com/office/mac/drawingml/2011/main" xmlns="" val="1"/>
+                    <ma14:wrappingTextBoxFlag xmlns="" xmlns:ma14="http://schemas.microsoft.com/office/mac/drawingml/2011/main" val="1"/>
                   </a:ext>
                 </a:extLst>
               </p:spPr>
@@ -9358,7 +9583,7 @@
             <a:effectLst/>
             <a:extLst>
               <a:ext uri="{C572A759-6A51-4108-AA02-DFA0A04FC94B}">
-                <ma14:wrappingTextBoxFlag xmlns:ma14="http://schemas.microsoft.com/office/mac/drawingml/2011/main" xmlns="" val="1"/>
+                <ma14:wrappingTextBoxFlag xmlns="" xmlns:ma14="http://schemas.microsoft.com/office/mac/drawingml/2011/main" val="1"/>
               </a:ext>
             </a:extLst>
           </p:spPr>
@@ -10767,7 +10992,7 @@
           </a:ln>
           <a:extLst>
             <a:ext uri="{C572A759-6A51-4108-AA02-DFA0A04FC94B}">
-              <ma14:wrappingTextBoxFlag xmlns:ma14="http://schemas.microsoft.com/office/mac/drawingml/2011/main" xmlns="" val="1"/>
+              <ma14:wrappingTextBoxFlag xmlns="" xmlns:ma14="http://schemas.microsoft.com/office/mac/drawingml/2011/main" val="1"/>
             </a:ext>
           </a:extLst>
         </p:spPr>
@@ -10851,7 +11076,7 @@
           </a:ln>
           <a:extLst>
             <a:ext uri="{C572A759-6A51-4108-AA02-DFA0A04FC94B}">
-              <ma14:wrappingTextBoxFlag xmlns:ma14="http://schemas.microsoft.com/office/mac/drawingml/2011/main" xmlns="" val="1"/>
+              <ma14:wrappingTextBoxFlag xmlns="" xmlns:ma14="http://schemas.microsoft.com/office/mac/drawingml/2011/main" val="1"/>
             </a:ext>
           </a:extLst>
         </p:spPr>
@@ -10928,7 +11153,7 @@
           </a:ln>
           <a:extLst>
             <a:ext uri="{C572A759-6A51-4108-AA02-DFA0A04FC94B}">
-              <ma14:wrappingTextBoxFlag xmlns:ma14="http://schemas.microsoft.com/office/mac/drawingml/2011/main" xmlns="" val="1"/>
+              <ma14:wrappingTextBoxFlag xmlns="" xmlns:ma14="http://schemas.microsoft.com/office/mac/drawingml/2011/main" val="1"/>
             </a:ext>
           </a:extLst>
         </p:spPr>
@@ -11210,7 +11435,7 @@
             <a:effectLst/>
             <a:extLst>
               <a:ext uri="{C572A759-6A51-4108-AA02-DFA0A04FC94B}">
-                <ma14:wrappingTextBoxFlag xmlns:ma14="http://schemas.microsoft.com/office/mac/drawingml/2011/main" xmlns="" val="1"/>
+                <ma14:wrappingTextBoxFlag xmlns="" xmlns:ma14="http://schemas.microsoft.com/office/mac/drawingml/2011/main" val="1"/>
               </a:ext>
             </a:extLst>
           </p:spPr>
@@ -11319,7 +11544,7 @@
               <a:effectLst/>
               <a:extLst>
                 <a:ext uri="{C572A759-6A51-4108-AA02-DFA0A04FC94B}">
-                  <ma14:wrappingTextBoxFlag xmlns:ma14="http://schemas.microsoft.com/office/mac/drawingml/2011/main" xmlns="" val="1"/>
+                  <ma14:wrappingTextBoxFlag xmlns="" xmlns:ma14="http://schemas.microsoft.com/office/mac/drawingml/2011/main" val="1"/>
                 </a:ext>
               </a:extLst>
             </p:spPr>
@@ -11385,7 +11610,7 @@
                 <a:effectLst/>
                 <a:extLst>
                   <a:ext uri="{C572A759-6A51-4108-AA02-DFA0A04FC94B}">
-                    <ma14:wrappingTextBoxFlag xmlns:ma14="http://schemas.microsoft.com/office/mac/drawingml/2011/main" xmlns="" val="1"/>
+                    <ma14:wrappingTextBoxFlag xmlns="" xmlns:ma14="http://schemas.microsoft.com/office/mac/drawingml/2011/main" val="1"/>
                   </a:ext>
                 </a:extLst>
               </p:spPr>
@@ -11434,7 +11659,7 @@
                 <a:effectLst/>
                 <a:extLst>
                   <a:ext uri="{C572A759-6A51-4108-AA02-DFA0A04FC94B}">
-                    <ma14:wrappingTextBoxFlag xmlns:ma14="http://schemas.microsoft.com/office/mac/drawingml/2011/main" xmlns="" val="1"/>
+                    <ma14:wrappingTextBoxFlag xmlns="" xmlns:ma14="http://schemas.microsoft.com/office/mac/drawingml/2011/main" val="1"/>
                   </a:ext>
                 </a:extLst>
               </p:spPr>
@@ -11483,7 +11708,7 @@
             <a:effectLst/>
             <a:extLst>
               <a:ext uri="{C572A759-6A51-4108-AA02-DFA0A04FC94B}">
-                <ma14:wrappingTextBoxFlag xmlns:ma14="http://schemas.microsoft.com/office/mac/drawingml/2011/main" xmlns="" val="1"/>
+                <ma14:wrappingTextBoxFlag xmlns="" xmlns:ma14="http://schemas.microsoft.com/office/mac/drawingml/2011/main" val="1"/>
               </a:ext>
             </a:extLst>
           </p:spPr>
@@ -12892,7 +13117,7 @@
           </a:ln>
           <a:extLst>
             <a:ext uri="{C572A759-6A51-4108-AA02-DFA0A04FC94B}">
-              <ma14:wrappingTextBoxFlag xmlns:ma14="http://schemas.microsoft.com/office/mac/drawingml/2011/main" xmlns="" val="1"/>
+              <ma14:wrappingTextBoxFlag xmlns="" xmlns:ma14="http://schemas.microsoft.com/office/mac/drawingml/2011/main" val="1"/>
             </a:ext>
           </a:extLst>
         </p:spPr>
@@ -12976,7 +13201,7 @@
           </a:ln>
           <a:extLst>
             <a:ext uri="{C572A759-6A51-4108-AA02-DFA0A04FC94B}">
-              <ma14:wrappingTextBoxFlag xmlns:ma14="http://schemas.microsoft.com/office/mac/drawingml/2011/main" xmlns="" val="1"/>
+              <ma14:wrappingTextBoxFlag xmlns="" xmlns:ma14="http://schemas.microsoft.com/office/mac/drawingml/2011/main" val="1"/>
             </a:ext>
           </a:extLst>
         </p:spPr>
@@ -13053,7 +13278,7 @@
           </a:ln>
           <a:extLst>
             <a:ext uri="{C572A759-6A51-4108-AA02-DFA0A04FC94B}">
-              <ma14:wrappingTextBoxFlag xmlns:ma14="http://schemas.microsoft.com/office/mac/drawingml/2011/main" xmlns="" val="1"/>
+              <ma14:wrappingTextBoxFlag xmlns="" xmlns:ma14="http://schemas.microsoft.com/office/mac/drawingml/2011/main" val="1"/>
             </a:ext>
           </a:extLst>
         </p:spPr>
@@ -13322,7 +13547,7 @@
           </a:ln>
           <a:extLst>
             <a:ext uri="{C572A759-6A51-4108-AA02-DFA0A04FC94B}">
-              <ma14:wrappingTextBoxFlag xmlns:ma14="http://schemas.microsoft.com/office/mac/drawingml/2011/main" xmlns="" val="1"/>
+              <ma14:wrappingTextBoxFlag xmlns="" xmlns:ma14="http://schemas.microsoft.com/office/mac/drawingml/2011/main" val="1"/>
             </a:ext>
           </a:extLst>
         </p:spPr>
@@ -13609,6 +13834,974 @@
 </file>
 
 <file path=ppt/slides/slide2.xml><?xml version="1.0" encoding="utf-8"?>
+<p:sld xmlns:a="http://schemas.openxmlformats.org/drawingml/2006/main" xmlns:r="http://schemas.openxmlformats.org/officeDocument/2006/relationships" xmlns:p="http://schemas.openxmlformats.org/presentationml/2006/main">
+  <p:cSld>
+    <p:spTree>
+      <p:nvGrpSpPr>
+        <p:cNvPr id="1" name=""/>
+        <p:cNvGrpSpPr/>
+        <p:nvPr/>
+      </p:nvGrpSpPr>
+      <p:grpSpPr>
+        <a:xfrm>
+          <a:off x="0" y="0"/>
+          <a:ext cx="0" cy="0"/>
+          <a:chOff x="0" y="0"/>
+          <a:chExt cx="0" cy="0"/>
+        </a:xfrm>
+      </p:grpSpPr>
+      <p:sp>
+        <p:nvSpPr>
+          <p:cNvPr id="144" name="Maven is a…"/>
+          <p:cNvSpPr txBox="1">
+            <a:spLocks noGrp="1"/>
+          </p:cNvSpPr>
+          <p:nvPr>
+            <p:ph type="title"/>
+          </p:nvPr>
+        </p:nvSpPr>
+        <p:spPr>
+          <a:prstGeom prst="rect">
+            <a:avLst/>
+          </a:prstGeom>
+        </p:spPr>
+        <p:txBody>
+          <a:bodyPr/>
+          <a:lstStyle/>
+          <a:p>
+            <a:pPr defTabSz="449833">
+              <a:defRPr sz="6160"/>
+            </a:pPr>
+            <a:r>
+              <a:t>Maven is a </a:t>
+            </a:r>
+          </a:p>
+          <a:p>
+            <a:pPr defTabSz="449833">
+              <a:defRPr sz="6160"/>
+            </a:pPr>
+            <a:r>
+              <a:t>Dependency Management Tool</a:t>
+            </a:r>
+          </a:p>
+        </p:txBody>
+      </p:sp>
+      <p:pic>
+        <p:nvPicPr>
+          <p:cNvPr id="145" name="pasted-image.png" descr="pasted-image.png"/>
+          <p:cNvPicPr>
+            <a:picLocks noChangeAspect="1"/>
+          </p:cNvPicPr>
+          <p:nvPr/>
+        </p:nvPicPr>
+        <p:blipFill>
+          <a:blip r:embed="rId3">
+            <a:extLst/>
+          </a:blip>
+          <a:stretch>
+            <a:fillRect/>
+          </a:stretch>
+        </p:blipFill>
+        <p:spPr>
+          <a:xfrm>
+            <a:off x="2996481" y="2641723"/>
+            <a:ext cx="7011838" cy="7143722"/>
+          </a:xfrm>
+          <a:prstGeom prst="rect">
+            <a:avLst/>
+          </a:prstGeom>
+          <a:ln w="12700">
+            <a:miter lim="400000"/>
+          </a:ln>
+        </p:spPr>
+      </p:pic>
+    </p:spTree>
+  </p:cSld>
+  <p:clrMapOvr>
+    <a:masterClrMapping/>
+  </p:clrMapOvr>
+  <p:transition spd="med"/>
+</p:sld>
+</file>
+
+<file path=ppt/slides/slide3.xml><?xml version="1.0" encoding="utf-8"?>
+<p:sld xmlns:a="http://schemas.openxmlformats.org/drawingml/2006/main" xmlns:r="http://schemas.openxmlformats.org/officeDocument/2006/relationships" xmlns:p="http://schemas.openxmlformats.org/presentationml/2006/main">
+  <p:cSld>
+    <p:spTree>
+      <p:nvGrpSpPr>
+        <p:cNvPr id="1" name=""/>
+        <p:cNvGrpSpPr/>
+        <p:nvPr/>
+      </p:nvGrpSpPr>
+      <p:grpSpPr>
+        <a:xfrm>
+          <a:off x="0" y="0"/>
+          <a:ext cx="0" cy="0"/>
+          <a:chOff x="0" y="0"/>
+          <a:chExt cx="0" cy="0"/>
+        </a:xfrm>
+      </p:grpSpPr>
+      <p:sp>
+        <p:nvSpPr>
+          <p:cNvPr id="149" name="Maven is a…"/>
+          <p:cNvSpPr txBox="1">
+            <a:spLocks noGrp="1"/>
+          </p:cNvSpPr>
+          <p:nvPr>
+            <p:ph type="title"/>
+          </p:nvPr>
+        </p:nvSpPr>
+        <p:spPr>
+          <a:prstGeom prst="rect">
+            <a:avLst/>
+          </a:prstGeom>
+        </p:spPr>
+        <p:txBody>
+          <a:bodyPr/>
+          <a:lstStyle/>
+          <a:p>
+            <a:pPr defTabSz="449833">
+              <a:defRPr sz="6160"/>
+            </a:pPr>
+            <a:r>
+              <a:t>Maven is a </a:t>
+            </a:r>
+          </a:p>
+          <a:p>
+            <a:pPr defTabSz="449833">
+              <a:defRPr sz="6160"/>
+            </a:pPr>
+            <a:r>
+              <a:t>Dependency Management Tool</a:t>
+            </a:r>
+          </a:p>
+        </p:txBody>
+      </p:sp>
+      <p:pic>
+        <p:nvPicPr>
+          <p:cNvPr id="150" name="pasted-image.png" descr="pasted-image.png"/>
+          <p:cNvPicPr>
+            <a:picLocks noChangeAspect="1"/>
+          </p:cNvPicPr>
+          <p:nvPr/>
+        </p:nvPicPr>
+        <p:blipFill>
+          <a:blip r:embed="rId3">
+            <a:extLst/>
+          </a:blip>
+          <a:stretch>
+            <a:fillRect/>
+          </a:stretch>
+        </p:blipFill>
+        <p:spPr>
+          <a:xfrm>
+            <a:off x="2996481" y="2641723"/>
+            <a:ext cx="7011838" cy="7143722"/>
+          </a:xfrm>
+          <a:prstGeom prst="rect">
+            <a:avLst/>
+          </a:prstGeom>
+          <a:ln w="12700">
+            <a:miter lim="400000"/>
+          </a:ln>
+        </p:spPr>
+      </p:pic>
+      <p:sp>
+        <p:nvSpPr>
+          <p:cNvPr id="151" name="Rounded Rectangle"/>
+          <p:cNvSpPr/>
+          <p:nvPr/>
+        </p:nvSpPr>
+        <p:spPr>
+          <a:xfrm>
+            <a:off x="3592781" y="6729622"/>
+            <a:ext cx="2936217" cy="746006"/>
+          </a:xfrm>
+          <a:prstGeom prst="roundRect">
+            <a:avLst>
+              <a:gd name="adj" fmla="val 20420"/>
+            </a:avLst>
+          </a:prstGeom>
+          <a:ln w="63500">
+            <a:solidFill>
+              <a:schemeClr val="accent5">
+                <a:hueOff val="-444211"/>
+                <a:satOff val="-14915"/>
+                <a:lumOff val="22857"/>
+              </a:schemeClr>
+            </a:solidFill>
+            <a:miter lim="400000"/>
+          </a:ln>
+        </p:spPr>
+        <p:txBody>
+          <a:bodyPr lIns="50800" tIns="50800" rIns="50800" bIns="50800" anchor="ctr"/>
+          <a:lstStyle/>
+          <a:p>
+            <a:pPr>
+              <a:defRPr sz="2400">
+                <a:solidFill>
+                  <a:srgbClr val="FFFFFF"/>
+                </a:solidFill>
+              </a:defRPr>
+            </a:pPr>
+            <a:endParaRPr/>
+          </a:p>
+        </p:txBody>
+      </p:sp>
+    </p:spTree>
+  </p:cSld>
+  <p:clrMapOvr>
+    <a:masterClrMapping/>
+  </p:clrMapOvr>
+  <p:transition spd="med"/>
+</p:sld>
+</file>
+
+<file path=ppt/slides/slide4.xml><?xml version="1.0" encoding="utf-8"?>
+<p:sld xmlns:a="http://schemas.openxmlformats.org/drawingml/2006/main" xmlns:r="http://schemas.openxmlformats.org/officeDocument/2006/relationships" xmlns:p="http://schemas.openxmlformats.org/presentationml/2006/main">
+  <p:cSld>
+    <p:spTree>
+      <p:nvGrpSpPr>
+        <p:cNvPr id="1" name=""/>
+        <p:cNvGrpSpPr/>
+        <p:nvPr/>
+      </p:nvGrpSpPr>
+      <p:grpSpPr>
+        <a:xfrm>
+          <a:off x="0" y="0"/>
+          <a:ext cx="0" cy="0"/>
+          <a:chOff x="0" y="0"/>
+          <a:chExt cx="0" cy="0"/>
+        </a:xfrm>
+      </p:grpSpPr>
+      <p:sp>
+        <p:nvSpPr>
+          <p:cNvPr id="161" name="Maven is a…"/>
+          <p:cNvSpPr txBox="1">
+            <a:spLocks noGrp="1"/>
+          </p:cNvSpPr>
+          <p:nvPr>
+            <p:ph type="title"/>
+          </p:nvPr>
+        </p:nvSpPr>
+        <p:spPr>
+          <a:prstGeom prst="rect">
+            <a:avLst/>
+          </a:prstGeom>
+        </p:spPr>
+        <p:txBody>
+          <a:bodyPr/>
+          <a:lstStyle/>
+          <a:p>
+            <a:pPr defTabSz="449833">
+              <a:defRPr sz="6160"/>
+            </a:pPr>
+            <a:r>
+              <a:t>Maven is a </a:t>
+            </a:r>
+          </a:p>
+          <a:p>
+            <a:pPr defTabSz="449833">
+              <a:defRPr sz="6160"/>
+            </a:pPr>
+            <a:r>
+              <a:t>Dependency Management Tool</a:t>
+            </a:r>
+          </a:p>
+        </p:txBody>
+      </p:sp>
+      <p:pic>
+        <p:nvPicPr>
+          <p:cNvPr id="162" name="pasted-image.png" descr="pasted-image.png"/>
+          <p:cNvPicPr>
+            <a:picLocks noChangeAspect="1"/>
+          </p:cNvPicPr>
+          <p:nvPr/>
+        </p:nvPicPr>
+        <p:blipFill>
+          <a:blip r:embed="rId3">
+            <a:extLst/>
+          </a:blip>
+          <a:stretch>
+            <a:fillRect/>
+          </a:stretch>
+        </p:blipFill>
+        <p:spPr>
+          <a:xfrm>
+            <a:off x="316847" y="2507471"/>
+            <a:ext cx="12371106" cy="7222277"/>
+          </a:xfrm>
+          <a:prstGeom prst="rect">
+            <a:avLst/>
+          </a:prstGeom>
+          <a:ln w="12700">
+            <a:miter lim="400000"/>
+          </a:ln>
+        </p:spPr>
+      </p:pic>
+      <p:sp>
+        <p:nvSpPr>
+          <p:cNvPr id="163" name="https://community.oracle.com/docs/DOC-982921"/>
+          <p:cNvSpPr txBox="1"/>
+          <p:nvPr/>
+        </p:nvSpPr>
+        <p:spPr>
+          <a:xfrm>
+            <a:off x="7894315" y="9302390"/>
+            <a:ext cx="5091428" cy="381001"/>
+          </a:xfrm>
+          <a:prstGeom prst="rect">
+            <a:avLst/>
+          </a:prstGeom>
+          <a:ln w="12700">
+            <a:miter lim="400000"/>
+          </a:ln>
+          <a:extLst>
+            <a:ext uri="{C572A759-6A51-4108-AA02-DFA0A04FC94B}">
+              <ma14:wrappingTextBoxFlag xmlns="" xmlns:ma14="http://schemas.microsoft.com/office/mac/drawingml/2011/main" val="1"/>
+            </a:ext>
+          </a:extLst>
+        </p:spPr>
+        <p:txBody>
+          <a:bodyPr lIns="50800" tIns="50800" rIns="50800" bIns="50800" anchor="ctr">
+            <a:spAutoFit/>
+          </a:bodyPr>
+          <a:lstStyle>
+            <a:lvl1pPr>
+              <a:defRPr sz="1800" i="1" u="sng">
+                <a:latin typeface="Helvetica"/>
+                <a:ea typeface="Helvetica"/>
+                <a:cs typeface="Helvetica"/>
+                <a:sym typeface="Helvetica"/>
+                <a:hlinkClick r:id="rId4"/>
+              </a:defRPr>
+            </a:lvl1pPr>
+          </a:lstStyle>
+          <a:p>
+            <a:pPr>
+              <a:defRPr u="none"/>
+            </a:pPr>
+            <a:r>
+              <a:rPr u="sng">
+                <a:hlinkClick r:id="rId4"/>
+              </a:rPr>
+              <a:t>https://community.oracle.com/docs/DOC-982921</a:t>
+            </a:r>
+          </a:p>
+        </p:txBody>
+      </p:sp>
+    </p:spTree>
+  </p:cSld>
+  <p:clrMapOvr>
+    <a:masterClrMapping/>
+  </p:clrMapOvr>
+  <p:transition spd="med"/>
+</p:sld>
+</file>
+
+<file path=ppt/slides/slide5.xml><?xml version="1.0" encoding="utf-8"?>
+<p:sld xmlns:a="http://schemas.openxmlformats.org/drawingml/2006/main" xmlns:r="http://schemas.openxmlformats.org/officeDocument/2006/relationships" xmlns:p="http://schemas.openxmlformats.org/presentationml/2006/main">
+  <p:cSld>
+    <p:spTree>
+      <p:nvGrpSpPr>
+        <p:cNvPr id="1" name=""/>
+        <p:cNvGrpSpPr/>
+        <p:nvPr/>
+      </p:nvGrpSpPr>
+      <p:grpSpPr>
+        <a:xfrm>
+          <a:off x="0" y="0"/>
+          <a:ext cx="0" cy="0"/>
+          <a:chOff x="0" y="0"/>
+          <a:chExt cx="0" cy="0"/>
+        </a:xfrm>
+      </p:grpSpPr>
+      <p:grpSp>
+        <p:nvGrpSpPr>
+          <p:cNvPr id="173" name="Group"/>
+          <p:cNvGrpSpPr/>
+          <p:nvPr/>
+        </p:nvGrpSpPr>
+        <p:grpSpPr>
+          <a:xfrm>
+            <a:off x="-144733" y="2447068"/>
+            <a:ext cx="5422352" cy="3595808"/>
+            <a:chOff x="0" y="0"/>
+            <a:chExt cx="5422350" cy="3595806"/>
+          </a:xfrm>
+        </p:grpSpPr>
+        <p:pic>
+          <p:nvPicPr>
+            <p:cNvPr id="171" name="pasted-image.png" descr="pasted-image.png"/>
+            <p:cNvPicPr>
+              <a:picLocks noChangeAspect="1"/>
+            </p:cNvPicPr>
+            <p:nvPr/>
+          </p:nvPicPr>
+          <p:blipFill>
+            <a:blip r:embed="rId3">
+              <a:extLst/>
+            </a:blip>
+            <a:stretch>
+              <a:fillRect/>
+            </a:stretch>
+          </p:blipFill>
+          <p:spPr>
+            <a:xfrm>
+              <a:off x="0" y="0"/>
+              <a:ext cx="5422351" cy="3062625"/>
+            </a:xfrm>
+            <a:prstGeom prst="rect">
+              <a:avLst/>
+            </a:prstGeom>
+            <a:ln w="12700" cap="flat">
+              <a:noFill/>
+              <a:miter lim="400000"/>
+            </a:ln>
+            <a:effectLst/>
+          </p:spPr>
+        </p:pic>
+        <p:pic>
+          <p:nvPicPr>
+            <p:cNvPr id="172" name="pasted-image.png" descr="pasted-image.png"/>
+            <p:cNvPicPr>
+              <a:picLocks noChangeAspect="1"/>
+            </p:cNvPicPr>
+            <p:nvPr/>
+          </p:nvPicPr>
+          <p:blipFill>
+            <a:blip r:embed="rId4">
+              <a:extLst/>
+            </a:blip>
+            <a:stretch>
+              <a:fillRect/>
+            </a:stretch>
+          </p:blipFill>
+          <p:spPr>
+            <a:xfrm>
+              <a:off x="876448" y="3043899"/>
+              <a:ext cx="1876485" cy="551908"/>
+            </a:xfrm>
+            <a:prstGeom prst="rect">
+              <a:avLst/>
+            </a:prstGeom>
+            <a:ln w="12700" cap="flat">
+              <a:noFill/>
+              <a:miter lim="400000"/>
+            </a:ln>
+            <a:effectLst/>
+          </p:spPr>
+        </p:pic>
+      </p:grpSp>
+    </p:spTree>
+  </p:cSld>
+  <p:clrMapOvr>
+    <a:masterClrMapping/>
+  </p:clrMapOvr>
+  <p:transition spd="med"/>
+</p:sld>
+</file>
+
+<file path=ppt/slides/slide6.xml><?xml version="1.0" encoding="utf-8"?>
+<p:sld xmlns:a="http://schemas.openxmlformats.org/drawingml/2006/main" xmlns:r="http://schemas.openxmlformats.org/officeDocument/2006/relationships" xmlns:p="http://schemas.openxmlformats.org/presentationml/2006/main">
+  <p:cSld>
+    <p:spTree>
+      <p:nvGrpSpPr>
+        <p:cNvPr id="1" name=""/>
+        <p:cNvGrpSpPr/>
+        <p:nvPr/>
+      </p:nvGrpSpPr>
+      <p:grpSpPr>
+        <a:xfrm>
+          <a:off x="0" y="0"/>
+          <a:ext cx="0" cy="0"/>
+          <a:chOff x="0" y="0"/>
+          <a:chExt cx="0" cy="0"/>
+        </a:xfrm>
+      </p:grpSpPr>
+      <p:pic>
+        <p:nvPicPr>
+          <p:cNvPr id="175" name="pasted-image.png" descr="pasted-image.png"/>
+          <p:cNvPicPr>
+            <a:picLocks noChangeAspect="1"/>
+          </p:cNvPicPr>
+          <p:nvPr/>
+        </p:nvPicPr>
+        <p:blipFill>
+          <a:blip r:embed="rId2">
+            <a:extLst/>
+          </a:blip>
+          <a:stretch>
+            <a:fillRect/>
+          </a:stretch>
+        </p:blipFill>
+        <p:spPr>
+          <a:xfrm>
+            <a:off x="6058978" y="152400"/>
+            <a:ext cx="7327901" cy="9448800"/>
+          </a:xfrm>
+          <a:prstGeom prst="rect">
+            <a:avLst/>
+          </a:prstGeom>
+          <a:ln w="12700">
+            <a:miter lim="400000"/>
+          </a:ln>
+        </p:spPr>
+      </p:pic>
+      <p:grpSp>
+        <p:nvGrpSpPr>
+          <p:cNvPr id="178" name="Group"/>
+          <p:cNvGrpSpPr/>
+          <p:nvPr/>
+        </p:nvGrpSpPr>
+        <p:grpSpPr>
+          <a:xfrm>
+            <a:off x="-144733" y="2447068"/>
+            <a:ext cx="5422352" cy="3595808"/>
+            <a:chOff x="0" y="0"/>
+            <a:chExt cx="5422350" cy="3595806"/>
+          </a:xfrm>
+        </p:grpSpPr>
+        <p:pic>
+          <p:nvPicPr>
+            <p:cNvPr id="176" name="pasted-image.png" descr="pasted-image.png"/>
+            <p:cNvPicPr>
+              <a:picLocks noChangeAspect="1"/>
+            </p:cNvPicPr>
+            <p:nvPr/>
+          </p:nvPicPr>
+          <p:blipFill>
+            <a:blip r:embed="rId3">
+              <a:extLst/>
+            </a:blip>
+            <a:stretch>
+              <a:fillRect/>
+            </a:stretch>
+          </p:blipFill>
+          <p:spPr>
+            <a:xfrm>
+              <a:off x="0" y="0"/>
+              <a:ext cx="5422351" cy="3062625"/>
+            </a:xfrm>
+            <a:prstGeom prst="rect">
+              <a:avLst/>
+            </a:prstGeom>
+            <a:ln w="12700" cap="flat">
+              <a:noFill/>
+              <a:miter lim="400000"/>
+            </a:ln>
+            <a:effectLst/>
+          </p:spPr>
+        </p:pic>
+        <p:pic>
+          <p:nvPicPr>
+            <p:cNvPr id="177" name="pasted-image.png" descr="pasted-image.png"/>
+            <p:cNvPicPr>
+              <a:picLocks noChangeAspect="1"/>
+            </p:cNvPicPr>
+            <p:nvPr/>
+          </p:nvPicPr>
+          <p:blipFill>
+            <a:blip r:embed="rId4">
+              <a:extLst/>
+            </a:blip>
+            <a:stretch>
+              <a:fillRect/>
+            </a:stretch>
+          </p:blipFill>
+          <p:spPr>
+            <a:xfrm>
+              <a:off x="876448" y="3043899"/>
+              <a:ext cx="1876485" cy="551908"/>
+            </a:xfrm>
+            <a:prstGeom prst="rect">
+              <a:avLst/>
+            </a:prstGeom>
+            <a:ln w="12700" cap="flat">
+              <a:noFill/>
+              <a:miter lim="400000"/>
+            </a:ln>
+            <a:effectLst/>
+          </p:spPr>
+        </p:pic>
+      </p:grpSp>
+      <p:sp>
+        <p:nvSpPr>
+          <p:cNvPr id="179" name="Rounded Rectangle"/>
+          <p:cNvSpPr/>
+          <p:nvPr/>
+        </p:nvSpPr>
+        <p:spPr>
+          <a:xfrm>
+            <a:off x="614452" y="5487418"/>
+            <a:ext cx="2195603" cy="536337"/>
+          </a:xfrm>
+          <a:prstGeom prst="roundRect">
+            <a:avLst>
+              <a:gd name="adj" fmla="val 25170"/>
+            </a:avLst>
+          </a:prstGeom>
+          <a:ln w="63500">
+            <a:solidFill>
+              <a:schemeClr val="accent5">
+                <a:hueOff val="-444211"/>
+                <a:satOff val="-14915"/>
+                <a:lumOff val="22857"/>
+              </a:schemeClr>
+            </a:solidFill>
+            <a:miter lim="400000"/>
+          </a:ln>
+        </p:spPr>
+        <p:txBody>
+          <a:bodyPr lIns="50800" tIns="50800" rIns="50800" bIns="50800" anchor="ctr"/>
+          <a:lstStyle/>
+          <a:p>
+            <a:pPr>
+              <a:defRPr sz="2400">
+                <a:solidFill>
+                  <a:srgbClr val="FFFFFF"/>
+                </a:solidFill>
+              </a:defRPr>
+            </a:pPr>
+            <a:endParaRPr/>
+          </a:p>
+        </p:txBody>
+      </p:sp>
+    </p:spTree>
+  </p:cSld>
+  <p:clrMapOvr>
+    <a:masterClrMapping/>
+  </p:clrMapOvr>
+  <p:transition spd="med"/>
+</p:sld>
+</file>
+
+<file path=ppt/slides/slide7.xml><?xml version="1.0" encoding="utf-8"?>
+<p:sld xmlns:a="http://schemas.openxmlformats.org/drawingml/2006/main" xmlns:r="http://schemas.openxmlformats.org/officeDocument/2006/relationships" xmlns:p="http://schemas.openxmlformats.org/presentationml/2006/main">
+  <p:cSld>
+    <p:spTree>
+      <p:nvGrpSpPr>
+        <p:cNvPr id="1" name=""/>
+        <p:cNvGrpSpPr/>
+        <p:nvPr/>
+      </p:nvGrpSpPr>
+      <p:grpSpPr>
+        <a:xfrm>
+          <a:off x="0" y="0"/>
+          <a:ext cx="0" cy="0"/>
+          <a:chOff x="0" y="0"/>
+          <a:chExt cx="0" cy="0"/>
+        </a:xfrm>
+      </p:grpSpPr>
+      <p:pic>
+        <p:nvPicPr>
+          <p:cNvPr id="181" name="pasted-image.png" descr="pasted-image.png"/>
+          <p:cNvPicPr>
+            <a:picLocks noChangeAspect="1"/>
+          </p:cNvPicPr>
+          <p:nvPr/>
+        </p:nvPicPr>
+        <p:blipFill>
+          <a:blip r:embed="rId3">
+            <a:extLst/>
+          </a:blip>
+          <a:stretch>
+            <a:fillRect/>
+          </a:stretch>
+        </p:blipFill>
+        <p:spPr>
+          <a:xfrm>
+            <a:off x="6058978" y="152400"/>
+            <a:ext cx="7327901" cy="9448800"/>
+          </a:xfrm>
+          <a:prstGeom prst="rect">
+            <a:avLst/>
+          </a:prstGeom>
+          <a:ln w="12700">
+            <a:miter lim="400000"/>
+          </a:ln>
+        </p:spPr>
+      </p:pic>
+      <p:grpSp>
+        <p:nvGrpSpPr>
+          <p:cNvPr id="184" name="Group"/>
+          <p:cNvGrpSpPr/>
+          <p:nvPr/>
+        </p:nvGrpSpPr>
+        <p:grpSpPr>
+          <a:xfrm>
+            <a:off x="-144733" y="2447068"/>
+            <a:ext cx="5422352" cy="3595808"/>
+            <a:chOff x="0" y="0"/>
+            <a:chExt cx="5422350" cy="3595806"/>
+          </a:xfrm>
+        </p:grpSpPr>
+        <p:pic>
+          <p:nvPicPr>
+            <p:cNvPr id="182" name="pasted-image.png" descr="pasted-image.png"/>
+            <p:cNvPicPr>
+              <a:picLocks noChangeAspect="1"/>
+            </p:cNvPicPr>
+            <p:nvPr/>
+          </p:nvPicPr>
+          <p:blipFill>
+            <a:blip r:embed="rId4">
+              <a:extLst/>
+            </a:blip>
+            <a:stretch>
+              <a:fillRect/>
+            </a:stretch>
+          </p:blipFill>
+          <p:spPr>
+            <a:xfrm>
+              <a:off x="0" y="0"/>
+              <a:ext cx="5422351" cy="3062625"/>
+            </a:xfrm>
+            <a:prstGeom prst="rect">
+              <a:avLst/>
+            </a:prstGeom>
+            <a:ln w="12700" cap="flat">
+              <a:noFill/>
+              <a:miter lim="400000"/>
+            </a:ln>
+            <a:effectLst/>
+          </p:spPr>
+        </p:pic>
+        <p:pic>
+          <p:nvPicPr>
+            <p:cNvPr id="183" name="pasted-image.png" descr="pasted-image.png"/>
+            <p:cNvPicPr>
+              <a:picLocks noChangeAspect="1"/>
+            </p:cNvPicPr>
+            <p:nvPr/>
+          </p:nvPicPr>
+          <p:blipFill>
+            <a:blip r:embed="rId5">
+              <a:extLst/>
+            </a:blip>
+            <a:stretch>
+              <a:fillRect/>
+            </a:stretch>
+          </p:blipFill>
+          <p:spPr>
+            <a:xfrm>
+              <a:off x="876448" y="3043899"/>
+              <a:ext cx="1876485" cy="551908"/>
+            </a:xfrm>
+            <a:prstGeom prst="rect">
+              <a:avLst/>
+            </a:prstGeom>
+            <a:ln w="12700" cap="flat">
+              <a:noFill/>
+              <a:miter lim="400000"/>
+            </a:ln>
+            <a:effectLst/>
+          </p:spPr>
+        </p:pic>
+      </p:grpSp>
+      <p:sp>
+        <p:nvSpPr>
+          <p:cNvPr id="185" name="Rounded Rectangle"/>
+          <p:cNvSpPr/>
+          <p:nvPr/>
+        </p:nvSpPr>
+        <p:spPr>
+          <a:xfrm>
+            <a:off x="6323701" y="1887807"/>
+            <a:ext cx="6496590" cy="1730376"/>
+          </a:xfrm>
+          <a:prstGeom prst="roundRect">
+            <a:avLst>
+              <a:gd name="adj" fmla="val 23084"/>
+            </a:avLst>
+          </a:prstGeom>
+          <a:ln w="63500">
+            <a:solidFill>
+              <a:schemeClr val="accent5">
+                <a:hueOff val="-444211"/>
+                <a:satOff val="-14915"/>
+                <a:lumOff val="22857"/>
+              </a:schemeClr>
+            </a:solidFill>
+            <a:miter lim="400000"/>
+          </a:ln>
+        </p:spPr>
+        <p:txBody>
+          <a:bodyPr lIns="50800" tIns="50800" rIns="50800" bIns="50800" anchor="ctr"/>
+          <a:lstStyle/>
+          <a:p>
+            <a:pPr>
+              <a:defRPr sz="2400">
+                <a:solidFill>
+                  <a:srgbClr val="FFFFFF"/>
+                </a:solidFill>
+              </a:defRPr>
+            </a:pPr>
+            <a:endParaRPr/>
+          </a:p>
+        </p:txBody>
+      </p:sp>
+      <p:sp>
+        <p:nvSpPr>
+          <p:cNvPr id="186" name="Rounded Rectangle"/>
+          <p:cNvSpPr/>
+          <p:nvPr/>
+        </p:nvSpPr>
+        <p:spPr>
+          <a:xfrm>
+            <a:off x="6323701" y="4890399"/>
+            <a:ext cx="6638087" cy="3532307"/>
+          </a:xfrm>
+          <a:prstGeom prst="roundRect">
+            <a:avLst>
+              <a:gd name="adj" fmla="val 11308"/>
+            </a:avLst>
+          </a:prstGeom>
+          <a:ln w="63500">
+            <a:solidFill>
+              <a:schemeClr val="accent5">
+                <a:hueOff val="-444211"/>
+                <a:satOff val="-14915"/>
+                <a:lumOff val="22857"/>
+              </a:schemeClr>
+            </a:solidFill>
+            <a:miter lim="400000"/>
+          </a:ln>
+        </p:spPr>
+        <p:txBody>
+          <a:bodyPr lIns="50800" tIns="50800" rIns="50800" bIns="50800" anchor="ctr"/>
+          <a:lstStyle/>
+          <a:p>
+            <a:pPr>
+              <a:defRPr sz="2400">
+                <a:solidFill>
+                  <a:srgbClr val="FFFFFF"/>
+                </a:solidFill>
+              </a:defRPr>
+            </a:pPr>
+            <a:endParaRPr/>
+          </a:p>
+        </p:txBody>
+      </p:sp>
+      <p:sp>
+        <p:nvSpPr>
+          <p:cNvPr id="187" name="Project…"/>
+          <p:cNvSpPr txBox="1"/>
+          <p:nvPr/>
+        </p:nvSpPr>
+        <p:spPr>
+          <a:xfrm>
+            <a:off x="3850412" y="2156095"/>
+            <a:ext cx="2451508" cy="1193801"/>
+          </a:xfrm>
+          <a:prstGeom prst="rect">
+            <a:avLst/>
+          </a:prstGeom>
+          <a:ln w="12700">
+            <a:miter lim="400000"/>
+          </a:ln>
+          <a:extLst>
+            <a:ext uri="{C572A759-6A51-4108-AA02-DFA0A04FC94B}">
+              <ma14:wrappingTextBoxFlag xmlns="" xmlns:ma14="http://schemas.microsoft.com/office/mac/drawingml/2011/main" val="1"/>
+            </a:ext>
+          </a:extLst>
+        </p:spPr>
+        <p:txBody>
+          <a:bodyPr wrap="none" lIns="50800" tIns="50800" rIns="50800" bIns="50800" anchor="ctr">
+            <a:spAutoFit/>
+          </a:bodyPr>
+          <a:lstStyle/>
+          <a:p>
+            <a:pPr>
+              <a:defRPr>
+                <a:solidFill>
+                  <a:schemeClr val="accent5">
+                    <a:hueOff val="-444211"/>
+                    <a:satOff val="-14915"/>
+                    <a:lumOff val="22857"/>
+                  </a:schemeClr>
+                </a:solidFill>
+              </a:defRPr>
+            </a:pPr>
+            <a:r>
+              <a:t>Project </a:t>
+            </a:r>
+          </a:p>
+          <a:p>
+            <a:pPr>
+              <a:defRPr>
+                <a:solidFill>
+                  <a:schemeClr val="accent5">
+                    <a:hueOff val="-444211"/>
+                    <a:satOff val="-14915"/>
+                    <a:lumOff val="22857"/>
+                  </a:schemeClr>
+                </a:solidFill>
+              </a:defRPr>
+            </a:pPr>
+            <a:r>
+              <a:t>Description</a:t>
+            </a:r>
+          </a:p>
+        </p:txBody>
+      </p:sp>
+      <p:sp>
+        <p:nvSpPr>
+          <p:cNvPr id="188" name="Dependencies"/>
+          <p:cNvSpPr txBox="1"/>
+          <p:nvPr/>
+        </p:nvSpPr>
+        <p:spPr>
+          <a:xfrm>
+            <a:off x="3105789" y="6332702"/>
+            <a:ext cx="3112618" cy="647701"/>
+          </a:xfrm>
+          <a:prstGeom prst="rect">
+            <a:avLst/>
+          </a:prstGeom>
+          <a:ln w="12700">
+            <a:miter lim="400000"/>
+          </a:ln>
+          <a:extLst>
+            <a:ext uri="{C572A759-6A51-4108-AA02-DFA0A04FC94B}">
+              <ma14:wrappingTextBoxFlag xmlns="" xmlns:ma14="http://schemas.microsoft.com/office/mac/drawingml/2011/main" val="1"/>
+            </a:ext>
+          </a:extLst>
+        </p:spPr>
+        <p:txBody>
+          <a:bodyPr wrap="none" lIns="50800" tIns="50800" rIns="50800" bIns="50800" anchor="ctr">
+            <a:spAutoFit/>
+          </a:bodyPr>
+          <a:lstStyle>
+            <a:lvl1pPr>
+              <a:defRPr>
+                <a:solidFill>
+                  <a:schemeClr val="accent5">
+                    <a:hueOff val="-444211"/>
+                    <a:satOff val="-14915"/>
+                    <a:lumOff val="22857"/>
+                  </a:schemeClr>
+                </a:solidFill>
+              </a:defRPr>
+            </a:lvl1pPr>
+          </a:lstStyle>
+          <a:p>
+            <a:r>
+              <a:t>Dependencies</a:t>
+            </a:r>
+          </a:p>
+        </p:txBody>
+      </p:sp>
+    </p:spTree>
+  </p:cSld>
+  <p:clrMapOvr>
+    <a:masterClrMapping/>
+  </p:clrMapOvr>
+  <p:transition spd="med"/>
+</p:sld>
+</file>
+
+<file path=ppt/slides/slide8.xml><?xml version="1.0" encoding="utf-8"?>
 <p:sld xmlns:a="http://schemas.openxmlformats.org/drawingml/2006/main" xmlns:r="http://schemas.openxmlformats.org/officeDocument/2006/relationships" xmlns:p="http://schemas.openxmlformats.org/presentationml/2006/main">
   <p:cSld>
     <p:spTree>
@@ -13872,7 +15065,7 @@
           </a:ln>
           <a:extLst>
             <a:ext uri="{C572A759-6A51-4108-AA02-DFA0A04FC94B}">
-              <ma14:wrappingTextBoxFlag xmlns:ma14="http://schemas.microsoft.com/office/mac/drawingml/2011/main" xmlns="" val="1"/>
+              <ma14:wrappingTextBoxFlag xmlns="" xmlns:ma14="http://schemas.microsoft.com/office/mac/drawingml/2011/main" val="1"/>
             </a:ext>
           </a:extLst>
         </p:spPr>
@@ -13940,7 +15133,7 @@
           </a:ln>
           <a:extLst>
             <a:ext uri="{C572A759-6A51-4108-AA02-DFA0A04FC94B}">
-              <ma14:wrappingTextBoxFlag xmlns:ma14="http://schemas.microsoft.com/office/mac/drawingml/2011/main" xmlns="" val="1"/>
+              <ma14:wrappingTextBoxFlag xmlns="" xmlns:ma14="http://schemas.microsoft.com/office/mac/drawingml/2011/main" val="1"/>
             </a:ext>
           </a:extLst>
         </p:spPr>
@@ -14008,7 +15201,7 @@
           </a:ln>
           <a:extLst>
             <a:ext uri="{C572A759-6A51-4108-AA02-DFA0A04FC94B}">
-              <ma14:wrappingTextBoxFlag xmlns:ma14="http://schemas.microsoft.com/office/mac/drawingml/2011/main" xmlns="" val="1"/>
+              <ma14:wrappingTextBoxFlag xmlns="" xmlns:ma14="http://schemas.microsoft.com/office/mac/drawingml/2011/main" val="1"/>
             </a:ext>
           </a:extLst>
         </p:spPr>
@@ -14076,7 +15269,7 @@
           </a:ln>
           <a:extLst>
             <a:ext uri="{C572A759-6A51-4108-AA02-DFA0A04FC94B}">
-              <ma14:wrappingTextBoxFlag xmlns:ma14="http://schemas.microsoft.com/office/mac/drawingml/2011/main" xmlns="" val="1"/>
+              <ma14:wrappingTextBoxFlag xmlns="" xmlns:ma14="http://schemas.microsoft.com/office/mac/drawingml/2011/main" val="1"/>
             </a:ext>
           </a:extLst>
         </p:spPr>
@@ -14144,7 +15337,7 @@
           </a:ln>
           <a:extLst>
             <a:ext uri="{C572A759-6A51-4108-AA02-DFA0A04FC94B}">
-              <ma14:wrappingTextBoxFlag xmlns:ma14="http://schemas.microsoft.com/office/mac/drawingml/2011/main" xmlns="" val="1"/>
+              <ma14:wrappingTextBoxFlag xmlns="" xmlns:ma14="http://schemas.microsoft.com/office/mac/drawingml/2011/main" val="1"/>
             </a:ext>
           </a:extLst>
         </p:spPr>
@@ -14161,974 +15354,11 @@
         </p:txBody>
       </p:sp>
     </p:spTree>
-  </p:cSld>
-  <p:clrMapOvr>
-    <a:masterClrMapping/>
-  </p:clrMapOvr>
-  <p:transition spd="med"/>
-</p:sld>
-</file>
-
-<file path=ppt/slides/slide3.xml><?xml version="1.0" encoding="utf-8"?>
-<p:sld xmlns:a="http://schemas.openxmlformats.org/drawingml/2006/main" xmlns:r="http://schemas.openxmlformats.org/officeDocument/2006/relationships" xmlns:p="http://schemas.openxmlformats.org/presentationml/2006/main">
-  <p:cSld>
-    <p:spTree>
-      <p:nvGrpSpPr>
-        <p:cNvPr id="1" name=""/>
-        <p:cNvGrpSpPr/>
-        <p:nvPr/>
-      </p:nvGrpSpPr>
-      <p:grpSpPr>
-        <a:xfrm>
-          <a:off x="0" y="0"/>
-          <a:ext cx="0" cy="0"/>
-          <a:chOff x="0" y="0"/>
-          <a:chExt cx="0" cy="0"/>
-        </a:xfrm>
-      </p:grpSpPr>
-      <p:sp>
-        <p:nvSpPr>
-          <p:cNvPr id="144" name="Maven is a…"/>
-          <p:cNvSpPr txBox="1">
-            <a:spLocks noGrp="1"/>
-          </p:cNvSpPr>
-          <p:nvPr>
-            <p:ph type="title"/>
-          </p:nvPr>
-        </p:nvSpPr>
-        <p:spPr>
-          <a:prstGeom prst="rect">
-            <a:avLst/>
-          </a:prstGeom>
-        </p:spPr>
-        <p:txBody>
-          <a:bodyPr/>
-          <a:lstStyle/>
-          <a:p>
-            <a:pPr defTabSz="449833">
-              <a:defRPr sz="6160"/>
-            </a:pPr>
-            <a:r>
-              <a:t>Maven is a </a:t>
-            </a:r>
-          </a:p>
-          <a:p>
-            <a:pPr defTabSz="449833">
-              <a:defRPr sz="6160"/>
-            </a:pPr>
-            <a:r>
-              <a:t>Dependency Management Tool</a:t>
-            </a:r>
-          </a:p>
-        </p:txBody>
-      </p:sp>
-      <p:pic>
-        <p:nvPicPr>
-          <p:cNvPr id="145" name="pasted-image.png" descr="pasted-image.png"/>
-          <p:cNvPicPr>
-            <a:picLocks noChangeAspect="1"/>
-          </p:cNvPicPr>
-          <p:nvPr/>
-        </p:nvPicPr>
-        <p:blipFill>
-          <a:blip r:embed="rId3">
-            <a:extLst/>
-          </a:blip>
-          <a:stretch>
-            <a:fillRect/>
-          </a:stretch>
-        </p:blipFill>
-        <p:spPr>
-          <a:xfrm>
-            <a:off x="2996481" y="2641723"/>
-            <a:ext cx="7011838" cy="7143722"/>
-          </a:xfrm>
-          <a:prstGeom prst="rect">
-            <a:avLst/>
-          </a:prstGeom>
-          <a:ln w="12700">
-            <a:miter lim="400000"/>
-          </a:ln>
-        </p:spPr>
-      </p:pic>
-    </p:spTree>
-  </p:cSld>
-  <p:clrMapOvr>
-    <a:masterClrMapping/>
-  </p:clrMapOvr>
-  <p:transition spd="med"/>
-</p:sld>
-</file>
-
-<file path=ppt/slides/slide4.xml><?xml version="1.0" encoding="utf-8"?>
-<p:sld xmlns:a="http://schemas.openxmlformats.org/drawingml/2006/main" xmlns:r="http://schemas.openxmlformats.org/officeDocument/2006/relationships" xmlns:p="http://schemas.openxmlformats.org/presentationml/2006/main">
-  <p:cSld>
-    <p:spTree>
-      <p:nvGrpSpPr>
-        <p:cNvPr id="1" name=""/>
-        <p:cNvGrpSpPr/>
-        <p:nvPr/>
-      </p:nvGrpSpPr>
-      <p:grpSpPr>
-        <a:xfrm>
-          <a:off x="0" y="0"/>
-          <a:ext cx="0" cy="0"/>
-          <a:chOff x="0" y="0"/>
-          <a:chExt cx="0" cy="0"/>
-        </a:xfrm>
-      </p:grpSpPr>
-      <p:sp>
-        <p:nvSpPr>
-          <p:cNvPr id="149" name="Maven is a…"/>
-          <p:cNvSpPr txBox="1">
-            <a:spLocks noGrp="1"/>
-          </p:cNvSpPr>
-          <p:nvPr>
-            <p:ph type="title"/>
-          </p:nvPr>
-        </p:nvSpPr>
-        <p:spPr>
-          <a:prstGeom prst="rect">
-            <a:avLst/>
-          </a:prstGeom>
-        </p:spPr>
-        <p:txBody>
-          <a:bodyPr/>
-          <a:lstStyle/>
-          <a:p>
-            <a:pPr defTabSz="449833">
-              <a:defRPr sz="6160"/>
-            </a:pPr>
-            <a:r>
-              <a:t>Maven is a </a:t>
-            </a:r>
-          </a:p>
-          <a:p>
-            <a:pPr defTabSz="449833">
-              <a:defRPr sz="6160"/>
-            </a:pPr>
-            <a:r>
-              <a:t>Dependency Management Tool</a:t>
-            </a:r>
-          </a:p>
-        </p:txBody>
-      </p:sp>
-      <p:pic>
-        <p:nvPicPr>
-          <p:cNvPr id="150" name="pasted-image.png" descr="pasted-image.png"/>
-          <p:cNvPicPr>
-            <a:picLocks noChangeAspect="1"/>
-          </p:cNvPicPr>
-          <p:nvPr/>
-        </p:nvPicPr>
-        <p:blipFill>
-          <a:blip r:embed="rId3">
-            <a:extLst/>
-          </a:blip>
-          <a:stretch>
-            <a:fillRect/>
-          </a:stretch>
-        </p:blipFill>
-        <p:spPr>
-          <a:xfrm>
-            <a:off x="2996481" y="2641723"/>
-            <a:ext cx="7011838" cy="7143722"/>
-          </a:xfrm>
-          <a:prstGeom prst="rect">
-            <a:avLst/>
-          </a:prstGeom>
-          <a:ln w="12700">
-            <a:miter lim="400000"/>
-          </a:ln>
-        </p:spPr>
-      </p:pic>
-      <p:sp>
-        <p:nvSpPr>
-          <p:cNvPr id="151" name="Rounded Rectangle"/>
-          <p:cNvSpPr/>
-          <p:nvPr/>
-        </p:nvSpPr>
-        <p:spPr>
-          <a:xfrm>
-            <a:off x="3592781" y="6729622"/>
-            <a:ext cx="2936217" cy="746006"/>
-          </a:xfrm>
-          <a:prstGeom prst="roundRect">
-            <a:avLst>
-              <a:gd name="adj" fmla="val 20420"/>
-            </a:avLst>
-          </a:prstGeom>
-          <a:ln w="63500">
-            <a:solidFill>
-              <a:schemeClr val="accent5">
-                <a:hueOff val="-444211"/>
-                <a:satOff val="-14915"/>
-                <a:lumOff val="22857"/>
-              </a:schemeClr>
-            </a:solidFill>
-            <a:miter lim="400000"/>
-          </a:ln>
-        </p:spPr>
-        <p:txBody>
-          <a:bodyPr lIns="50800" tIns="50800" rIns="50800" bIns="50800" anchor="ctr"/>
-          <a:lstStyle/>
-          <a:p>
-            <a:pPr>
-              <a:defRPr sz="2400">
-                <a:solidFill>
-                  <a:srgbClr val="FFFFFF"/>
-                </a:solidFill>
-              </a:defRPr>
-            </a:pPr>
-            <a:endParaRPr/>
-          </a:p>
-        </p:txBody>
-      </p:sp>
-    </p:spTree>
-  </p:cSld>
-  <p:clrMapOvr>
-    <a:masterClrMapping/>
-  </p:clrMapOvr>
-  <p:transition spd="med"/>
-</p:sld>
-</file>
-
-<file path=ppt/slides/slide5.xml><?xml version="1.0" encoding="utf-8"?>
-<p:sld xmlns:a="http://schemas.openxmlformats.org/drawingml/2006/main" xmlns:r="http://schemas.openxmlformats.org/officeDocument/2006/relationships" xmlns:p="http://schemas.openxmlformats.org/presentationml/2006/main">
-  <p:cSld>
-    <p:spTree>
-      <p:nvGrpSpPr>
-        <p:cNvPr id="1" name=""/>
-        <p:cNvGrpSpPr/>
-        <p:nvPr/>
-      </p:nvGrpSpPr>
-      <p:grpSpPr>
-        <a:xfrm>
-          <a:off x="0" y="0"/>
-          <a:ext cx="0" cy="0"/>
-          <a:chOff x="0" y="0"/>
-          <a:chExt cx="0" cy="0"/>
-        </a:xfrm>
-      </p:grpSpPr>
-      <p:sp>
-        <p:nvSpPr>
-          <p:cNvPr id="161" name="Maven is a…"/>
-          <p:cNvSpPr txBox="1">
-            <a:spLocks noGrp="1"/>
-          </p:cNvSpPr>
-          <p:nvPr>
-            <p:ph type="title"/>
-          </p:nvPr>
-        </p:nvSpPr>
-        <p:spPr>
-          <a:prstGeom prst="rect">
-            <a:avLst/>
-          </a:prstGeom>
-        </p:spPr>
-        <p:txBody>
-          <a:bodyPr/>
-          <a:lstStyle/>
-          <a:p>
-            <a:pPr defTabSz="449833">
-              <a:defRPr sz="6160"/>
-            </a:pPr>
-            <a:r>
-              <a:t>Maven is a </a:t>
-            </a:r>
-          </a:p>
-          <a:p>
-            <a:pPr defTabSz="449833">
-              <a:defRPr sz="6160"/>
-            </a:pPr>
-            <a:r>
-              <a:t>Dependency Management Tool</a:t>
-            </a:r>
-          </a:p>
-        </p:txBody>
-      </p:sp>
-      <p:pic>
-        <p:nvPicPr>
-          <p:cNvPr id="162" name="pasted-image.png" descr="pasted-image.png"/>
-          <p:cNvPicPr>
-            <a:picLocks noChangeAspect="1"/>
-          </p:cNvPicPr>
-          <p:nvPr/>
-        </p:nvPicPr>
-        <p:blipFill>
-          <a:blip r:embed="rId3">
-            <a:extLst/>
-          </a:blip>
-          <a:stretch>
-            <a:fillRect/>
-          </a:stretch>
-        </p:blipFill>
-        <p:spPr>
-          <a:xfrm>
-            <a:off x="316847" y="2507471"/>
-            <a:ext cx="12371106" cy="7222277"/>
-          </a:xfrm>
-          <a:prstGeom prst="rect">
-            <a:avLst/>
-          </a:prstGeom>
-          <a:ln w="12700">
-            <a:miter lim="400000"/>
-          </a:ln>
-        </p:spPr>
-      </p:pic>
-      <p:sp>
-        <p:nvSpPr>
-          <p:cNvPr id="163" name="https://community.oracle.com/docs/DOC-982921"/>
-          <p:cNvSpPr txBox="1"/>
-          <p:nvPr/>
-        </p:nvSpPr>
-        <p:spPr>
-          <a:xfrm>
-            <a:off x="7894315" y="9302390"/>
-            <a:ext cx="5091428" cy="381001"/>
-          </a:xfrm>
-          <a:prstGeom prst="rect">
-            <a:avLst/>
-          </a:prstGeom>
-          <a:ln w="12700">
-            <a:miter lim="400000"/>
-          </a:ln>
-          <a:extLst>
-            <a:ext uri="{C572A759-6A51-4108-AA02-DFA0A04FC94B}">
-              <ma14:wrappingTextBoxFlag xmlns:ma14="http://schemas.microsoft.com/office/mac/drawingml/2011/main" xmlns="" val="1"/>
-            </a:ext>
-          </a:extLst>
-        </p:spPr>
-        <p:txBody>
-          <a:bodyPr lIns="50800" tIns="50800" rIns="50800" bIns="50800" anchor="ctr">
-            <a:spAutoFit/>
-          </a:bodyPr>
-          <a:lstStyle>
-            <a:lvl1pPr>
-              <a:defRPr sz="1800" i="1" u="sng">
-                <a:latin typeface="Helvetica"/>
-                <a:ea typeface="Helvetica"/>
-                <a:cs typeface="Helvetica"/>
-                <a:sym typeface="Helvetica"/>
-                <a:hlinkClick r:id="rId4"/>
-              </a:defRPr>
-            </a:lvl1pPr>
-          </a:lstStyle>
-          <a:p>
-            <a:pPr>
-              <a:defRPr u="none"/>
-            </a:pPr>
-            <a:r>
-              <a:rPr u="sng">
-                <a:hlinkClick r:id="rId4"/>
-              </a:rPr>
-              <a:t>https://community.oracle.com/docs/DOC-982921</a:t>
-            </a:r>
-          </a:p>
-        </p:txBody>
-      </p:sp>
-    </p:spTree>
-  </p:cSld>
-  <p:clrMapOvr>
-    <a:masterClrMapping/>
-  </p:clrMapOvr>
-  <p:transition spd="med"/>
-</p:sld>
-</file>
-
-<file path=ppt/slides/slide6.xml><?xml version="1.0" encoding="utf-8"?>
-<p:sld xmlns:a="http://schemas.openxmlformats.org/drawingml/2006/main" xmlns:r="http://schemas.openxmlformats.org/officeDocument/2006/relationships" xmlns:p="http://schemas.openxmlformats.org/presentationml/2006/main">
-  <p:cSld>
-    <p:spTree>
-      <p:nvGrpSpPr>
-        <p:cNvPr id="1" name=""/>
-        <p:cNvGrpSpPr/>
-        <p:nvPr/>
-      </p:nvGrpSpPr>
-      <p:grpSpPr>
-        <a:xfrm>
-          <a:off x="0" y="0"/>
-          <a:ext cx="0" cy="0"/>
-          <a:chOff x="0" y="0"/>
-          <a:chExt cx="0" cy="0"/>
-        </a:xfrm>
-      </p:grpSpPr>
-      <p:grpSp>
-        <p:nvGrpSpPr>
-          <p:cNvPr id="173" name="Group"/>
-          <p:cNvGrpSpPr/>
-          <p:nvPr/>
-        </p:nvGrpSpPr>
-        <p:grpSpPr>
-          <a:xfrm>
-            <a:off x="-144733" y="2447068"/>
-            <a:ext cx="5422352" cy="3595808"/>
-            <a:chOff x="0" y="0"/>
-            <a:chExt cx="5422350" cy="3595806"/>
-          </a:xfrm>
-        </p:grpSpPr>
-        <p:pic>
-          <p:nvPicPr>
-            <p:cNvPr id="171" name="pasted-image.png" descr="pasted-image.png"/>
-            <p:cNvPicPr>
-              <a:picLocks noChangeAspect="1"/>
-            </p:cNvPicPr>
-            <p:nvPr/>
-          </p:nvPicPr>
-          <p:blipFill>
-            <a:blip r:embed="rId3">
-              <a:extLst/>
-            </a:blip>
-            <a:stretch>
-              <a:fillRect/>
-            </a:stretch>
-          </p:blipFill>
-          <p:spPr>
-            <a:xfrm>
-              <a:off x="0" y="0"/>
-              <a:ext cx="5422351" cy="3062625"/>
-            </a:xfrm>
-            <a:prstGeom prst="rect">
-              <a:avLst/>
-            </a:prstGeom>
-            <a:ln w="12700" cap="flat">
-              <a:noFill/>
-              <a:miter lim="400000"/>
-            </a:ln>
-            <a:effectLst/>
-          </p:spPr>
-        </p:pic>
-        <p:pic>
-          <p:nvPicPr>
-            <p:cNvPr id="172" name="pasted-image.png" descr="pasted-image.png"/>
-            <p:cNvPicPr>
-              <a:picLocks noChangeAspect="1"/>
-            </p:cNvPicPr>
-            <p:nvPr/>
-          </p:nvPicPr>
-          <p:blipFill>
-            <a:blip r:embed="rId4">
-              <a:extLst/>
-            </a:blip>
-            <a:stretch>
-              <a:fillRect/>
-            </a:stretch>
-          </p:blipFill>
-          <p:spPr>
-            <a:xfrm>
-              <a:off x="876448" y="3043899"/>
-              <a:ext cx="1876485" cy="551908"/>
-            </a:xfrm>
-            <a:prstGeom prst="rect">
-              <a:avLst/>
-            </a:prstGeom>
-            <a:ln w="12700" cap="flat">
-              <a:noFill/>
-              <a:miter lim="400000"/>
-            </a:ln>
-            <a:effectLst/>
-          </p:spPr>
-        </p:pic>
-      </p:grpSp>
-    </p:spTree>
-  </p:cSld>
-  <p:clrMapOvr>
-    <a:masterClrMapping/>
-  </p:clrMapOvr>
-  <p:transition spd="med"/>
-</p:sld>
-</file>
-
-<file path=ppt/slides/slide7.xml><?xml version="1.0" encoding="utf-8"?>
-<p:sld xmlns:a="http://schemas.openxmlformats.org/drawingml/2006/main" xmlns:r="http://schemas.openxmlformats.org/officeDocument/2006/relationships" xmlns:p="http://schemas.openxmlformats.org/presentationml/2006/main">
-  <p:cSld>
-    <p:spTree>
-      <p:nvGrpSpPr>
-        <p:cNvPr id="1" name=""/>
-        <p:cNvGrpSpPr/>
-        <p:nvPr/>
-      </p:nvGrpSpPr>
-      <p:grpSpPr>
-        <a:xfrm>
-          <a:off x="0" y="0"/>
-          <a:ext cx="0" cy="0"/>
-          <a:chOff x="0" y="0"/>
-          <a:chExt cx="0" cy="0"/>
-        </a:xfrm>
-      </p:grpSpPr>
-      <p:pic>
-        <p:nvPicPr>
-          <p:cNvPr id="175" name="pasted-image.png" descr="pasted-image.png"/>
-          <p:cNvPicPr>
-            <a:picLocks noChangeAspect="1"/>
-          </p:cNvPicPr>
-          <p:nvPr/>
-        </p:nvPicPr>
-        <p:blipFill>
-          <a:blip r:embed="rId2">
-            <a:extLst/>
-          </a:blip>
-          <a:stretch>
-            <a:fillRect/>
-          </a:stretch>
-        </p:blipFill>
-        <p:spPr>
-          <a:xfrm>
-            <a:off x="6058978" y="152400"/>
-            <a:ext cx="7327901" cy="9448800"/>
-          </a:xfrm>
-          <a:prstGeom prst="rect">
-            <a:avLst/>
-          </a:prstGeom>
-          <a:ln w="12700">
-            <a:miter lim="400000"/>
-          </a:ln>
-        </p:spPr>
-      </p:pic>
-      <p:grpSp>
-        <p:nvGrpSpPr>
-          <p:cNvPr id="178" name="Group"/>
-          <p:cNvGrpSpPr/>
-          <p:nvPr/>
-        </p:nvGrpSpPr>
-        <p:grpSpPr>
-          <a:xfrm>
-            <a:off x="-144733" y="2447068"/>
-            <a:ext cx="5422352" cy="3595808"/>
-            <a:chOff x="0" y="0"/>
-            <a:chExt cx="5422350" cy="3595806"/>
-          </a:xfrm>
-        </p:grpSpPr>
-        <p:pic>
-          <p:nvPicPr>
-            <p:cNvPr id="176" name="pasted-image.png" descr="pasted-image.png"/>
-            <p:cNvPicPr>
-              <a:picLocks noChangeAspect="1"/>
-            </p:cNvPicPr>
-            <p:nvPr/>
-          </p:nvPicPr>
-          <p:blipFill>
-            <a:blip r:embed="rId3">
-              <a:extLst/>
-            </a:blip>
-            <a:stretch>
-              <a:fillRect/>
-            </a:stretch>
-          </p:blipFill>
-          <p:spPr>
-            <a:xfrm>
-              <a:off x="0" y="0"/>
-              <a:ext cx="5422351" cy="3062625"/>
-            </a:xfrm>
-            <a:prstGeom prst="rect">
-              <a:avLst/>
-            </a:prstGeom>
-            <a:ln w="12700" cap="flat">
-              <a:noFill/>
-              <a:miter lim="400000"/>
-            </a:ln>
-            <a:effectLst/>
-          </p:spPr>
-        </p:pic>
-        <p:pic>
-          <p:nvPicPr>
-            <p:cNvPr id="177" name="pasted-image.png" descr="pasted-image.png"/>
-            <p:cNvPicPr>
-              <a:picLocks noChangeAspect="1"/>
-            </p:cNvPicPr>
-            <p:nvPr/>
-          </p:nvPicPr>
-          <p:blipFill>
-            <a:blip r:embed="rId4">
-              <a:extLst/>
-            </a:blip>
-            <a:stretch>
-              <a:fillRect/>
-            </a:stretch>
-          </p:blipFill>
-          <p:spPr>
-            <a:xfrm>
-              <a:off x="876448" y="3043899"/>
-              <a:ext cx="1876485" cy="551908"/>
-            </a:xfrm>
-            <a:prstGeom prst="rect">
-              <a:avLst/>
-            </a:prstGeom>
-            <a:ln w="12700" cap="flat">
-              <a:noFill/>
-              <a:miter lim="400000"/>
-            </a:ln>
-            <a:effectLst/>
-          </p:spPr>
-        </p:pic>
-      </p:grpSp>
-      <p:sp>
-        <p:nvSpPr>
-          <p:cNvPr id="179" name="Rounded Rectangle"/>
-          <p:cNvSpPr/>
-          <p:nvPr/>
-        </p:nvSpPr>
-        <p:spPr>
-          <a:xfrm>
-            <a:off x="614452" y="5487418"/>
-            <a:ext cx="2195603" cy="536337"/>
-          </a:xfrm>
-          <a:prstGeom prst="roundRect">
-            <a:avLst>
-              <a:gd name="adj" fmla="val 25170"/>
-            </a:avLst>
-          </a:prstGeom>
-          <a:ln w="63500">
-            <a:solidFill>
-              <a:schemeClr val="accent5">
-                <a:hueOff val="-444211"/>
-                <a:satOff val="-14915"/>
-                <a:lumOff val="22857"/>
-              </a:schemeClr>
-            </a:solidFill>
-            <a:miter lim="400000"/>
-          </a:ln>
-        </p:spPr>
-        <p:txBody>
-          <a:bodyPr lIns="50800" tIns="50800" rIns="50800" bIns="50800" anchor="ctr"/>
-          <a:lstStyle/>
-          <a:p>
-            <a:pPr>
-              <a:defRPr sz="2400">
-                <a:solidFill>
-                  <a:srgbClr val="FFFFFF"/>
-                </a:solidFill>
-              </a:defRPr>
-            </a:pPr>
-            <a:endParaRPr/>
-          </a:p>
-        </p:txBody>
-      </p:sp>
-    </p:spTree>
-  </p:cSld>
-  <p:clrMapOvr>
-    <a:masterClrMapping/>
-  </p:clrMapOvr>
-  <p:transition spd="med"/>
-</p:sld>
-</file>
-
-<file path=ppt/slides/slide8.xml><?xml version="1.0" encoding="utf-8"?>
-<p:sld xmlns:a="http://schemas.openxmlformats.org/drawingml/2006/main" xmlns:r="http://schemas.openxmlformats.org/officeDocument/2006/relationships" xmlns:p="http://schemas.openxmlformats.org/presentationml/2006/main">
-  <p:cSld>
-    <p:spTree>
-      <p:nvGrpSpPr>
-        <p:cNvPr id="1" name=""/>
-        <p:cNvGrpSpPr/>
-        <p:nvPr/>
-      </p:nvGrpSpPr>
-      <p:grpSpPr>
-        <a:xfrm>
-          <a:off x="0" y="0"/>
-          <a:ext cx="0" cy="0"/>
-          <a:chOff x="0" y="0"/>
-          <a:chExt cx="0" cy="0"/>
-        </a:xfrm>
-      </p:grpSpPr>
-      <p:pic>
-        <p:nvPicPr>
-          <p:cNvPr id="181" name="pasted-image.png" descr="pasted-image.png"/>
-          <p:cNvPicPr>
-            <a:picLocks noChangeAspect="1"/>
-          </p:cNvPicPr>
-          <p:nvPr/>
-        </p:nvPicPr>
-        <p:blipFill>
-          <a:blip r:embed="rId3">
-            <a:extLst/>
-          </a:blip>
-          <a:stretch>
-            <a:fillRect/>
-          </a:stretch>
-        </p:blipFill>
-        <p:spPr>
-          <a:xfrm>
-            <a:off x="6058978" y="152400"/>
-            <a:ext cx="7327901" cy="9448800"/>
-          </a:xfrm>
-          <a:prstGeom prst="rect">
-            <a:avLst/>
-          </a:prstGeom>
-          <a:ln w="12700">
-            <a:miter lim="400000"/>
-          </a:ln>
-        </p:spPr>
-      </p:pic>
-      <p:grpSp>
-        <p:nvGrpSpPr>
-          <p:cNvPr id="184" name="Group"/>
-          <p:cNvGrpSpPr/>
-          <p:nvPr/>
-        </p:nvGrpSpPr>
-        <p:grpSpPr>
-          <a:xfrm>
-            <a:off x="-144733" y="2447068"/>
-            <a:ext cx="5422352" cy="3595808"/>
-            <a:chOff x="0" y="0"/>
-            <a:chExt cx="5422350" cy="3595806"/>
-          </a:xfrm>
-        </p:grpSpPr>
-        <p:pic>
-          <p:nvPicPr>
-            <p:cNvPr id="182" name="pasted-image.png" descr="pasted-image.png"/>
-            <p:cNvPicPr>
-              <a:picLocks noChangeAspect="1"/>
-            </p:cNvPicPr>
-            <p:nvPr/>
-          </p:nvPicPr>
-          <p:blipFill>
-            <a:blip r:embed="rId4">
-              <a:extLst/>
-            </a:blip>
-            <a:stretch>
-              <a:fillRect/>
-            </a:stretch>
-          </p:blipFill>
-          <p:spPr>
-            <a:xfrm>
-              <a:off x="0" y="0"/>
-              <a:ext cx="5422351" cy="3062625"/>
-            </a:xfrm>
-            <a:prstGeom prst="rect">
-              <a:avLst/>
-            </a:prstGeom>
-            <a:ln w="12700" cap="flat">
-              <a:noFill/>
-              <a:miter lim="400000"/>
-            </a:ln>
-            <a:effectLst/>
-          </p:spPr>
-        </p:pic>
-        <p:pic>
-          <p:nvPicPr>
-            <p:cNvPr id="183" name="pasted-image.png" descr="pasted-image.png"/>
-            <p:cNvPicPr>
-              <a:picLocks noChangeAspect="1"/>
-            </p:cNvPicPr>
-            <p:nvPr/>
-          </p:nvPicPr>
-          <p:blipFill>
-            <a:blip r:embed="rId5">
-              <a:extLst/>
-            </a:blip>
-            <a:stretch>
-              <a:fillRect/>
-            </a:stretch>
-          </p:blipFill>
-          <p:spPr>
-            <a:xfrm>
-              <a:off x="876448" y="3043899"/>
-              <a:ext cx="1876485" cy="551908"/>
-            </a:xfrm>
-            <a:prstGeom prst="rect">
-              <a:avLst/>
-            </a:prstGeom>
-            <a:ln w="12700" cap="flat">
-              <a:noFill/>
-              <a:miter lim="400000"/>
-            </a:ln>
-            <a:effectLst/>
-          </p:spPr>
-        </p:pic>
-      </p:grpSp>
-      <p:sp>
-        <p:nvSpPr>
-          <p:cNvPr id="185" name="Rounded Rectangle"/>
-          <p:cNvSpPr/>
-          <p:nvPr/>
-        </p:nvSpPr>
-        <p:spPr>
-          <a:xfrm>
-            <a:off x="6323701" y="1887807"/>
-            <a:ext cx="6496590" cy="1730376"/>
-          </a:xfrm>
-          <a:prstGeom prst="roundRect">
-            <a:avLst>
-              <a:gd name="adj" fmla="val 23084"/>
-            </a:avLst>
-          </a:prstGeom>
-          <a:ln w="63500">
-            <a:solidFill>
-              <a:schemeClr val="accent5">
-                <a:hueOff val="-444211"/>
-                <a:satOff val="-14915"/>
-                <a:lumOff val="22857"/>
-              </a:schemeClr>
-            </a:solidFill>
-            <a:miter lim="400000"/>
-          </a:ln>
-        </p:spPr>
-        <p:txBody>
-          <a:bodyPr lIns="50800" tIns="50800" rIns="50800" bIns="50800" anchor="ctr"/>
-          <a:lstStyle/>
-          <a:p>
-            <a:pPr>
-              <a:defRPr sz="2400">
-                <a:solidFill>
-                  <a:srgbClr val="FFFFFF"/>
-                </a:solidFill>
-              </a:defRPr>
-            </a:pPr>
-            <a:endParaRPr/>
-          </a:p>
-        </p:txBody>
-      </p:sp>
-      <p:sp>
-        <p:nvSpPr>
-          <p:cNvPr id="186" name="Rounded Rectangle"/>
-          <p:cNvSpPr/>
-          <p:nvPr/>
-        </p:nvSpPr>
-        <p:spPr>
-          <a:xfrm>
-            <a:off x="6323701" y="4890399"/>
-            <a:ext cx="6638087" cy="3532307"/>
-          </a:xfrm>
-          <a:prstGeom prst="roundRect">
-            <a:avLst>
-              <a:gd name="adj" fmla="val 11308"/>
-            </a:avLst>
-          </a:prstGeom>
-          <a:ln w="63500">
-            <a:solidFill>
-              <a:schemeClr val="accent5">
-                <a:hueOff val="-444211"/>
-                <a:satOff val="-14915"/>
-                <a:lumOff val="22857"/>
-              </a:schemeClr>
-            </a:solidFill>
-            <a:miter lim="400000"/>
-          </a:ln>
-        </p:spPr>
-        <p:txBody>
-          <a:bodyPr lIns="50800" tIns="50800" rIns="50800" bIns="50800" anchor="ctr"/>
-          <a:lstStyle/>
-          <a:p>
-            <a:pPr>
-              <a:defRPr sz="2400">
-                <a:solidFill>
-                  <a:srgbClr val="FFFFFF"/>
-                </a:solidFill>
-              </a:defRPr>
-            </a:pPr>
-            <a:endParaRPr/>
-          </a:p>
-        </p:txBody>
-      </p:sp>
-      <p:sp>
-        <p:nvSpPr>
-          <p:cNvPr id="187" name="Project…"/>
-          <p:cNvSpPr txBox="1"/>
-          <p:nvPr/>
-        </p:nvSpPr>
-        <p:spPr>
-          <a:xfrm>
-            <a:off x="3850412" y="2156095"/>
-            <a:ext cx="2451508" cy="1193801"/>
-          </a:xfrm>
-          <a:prstGeom prst="rect">
-            <a:avLst/>
-          </a:prstGeom>
-          <a:ln w="12700">
-            <a:miter lim="400000"/>
-          </a:ln>
-          <a:extLst>
-            <a:ext uri="{C572A759-6A51-4108-AA02-DFA0A04FC94B}">
-              <ma14:wrappingTextBoxFlag xmlns:ma14="http://schemas.microsoft.com/office/mac/drawingml/2011/main" xmlns="" val="1"/>
-            </a:ext>
-          </a:extLst>
-        </p:spPr>
-        <p:txBody>
-          <a:bodyPr wrap="none" lIns="50800" tIns="50800" rIns="50800" bIns="50800" anchor="ctr">
-            <a:spAutoFit/>
-          </a:bodyPr>
-          <a:lstStyle/>
-          <a:p>
-            <a:pPr>
-              <a:defRPr>
-                <a:solidFill>
-                  <a:schemeClr val="accent5">
-                    <a:hueOff val="-444211"/>
-                    <a:satOff val="-14915"/>
-                    <a:lumOff val="22857"/>
-                  </a:schemeClr>
-                </a:solidFill>
-              </a:defRPr>
-            </a:pPr>
-            <a:r>
-              <a:t>Project </a:t>
-            </a:r>
-          </a:p>
-          <a:p>
-            <a:pPr>
-              <a:defRPr>
-                <a:solidFill>
-                  <a:schemeClr val="accent5">
-                    <a:hueOff val="-444211"/>
-                    <a:satOff val="-14915"/>
-                    <a:lumOff val="22857"/>
-                  </a:schemeClr>
-                </a:solidFill>
-              </a:defRPr>
-            </a:pPr>
-            <a:r>
-              <a:t>Description</a:t>
-            </a:r>
-          </a:p>
-        </p:txBody>
-      </p:sp>
-      <p:sp>
-        <p:nvSpPr>
-          <p:cNvPr id="188" name="Dependencies"/>
-          <p:cNvSpPr txBox="1"/>
-          <p:nvPr/>
-        </p:nvSpPr>
-        <p:spPr>
-          <a:xfrm>
-            <a:off x="3105789" y="6332702"/>
-            <a:ext cx="3112618" cy="647701"/>
-          </a:xfrm>
-          <a:prstGeom prst="rect">
-            <a:avLst/>
-          </a:prstGeom>
-          <a:ln w="12700">
-            <a:miter lim="400000"/>
-          </a:ln>
-          <a:extLst>
-            <a:ext uri="{C572A759-6A51-4108-AA02-DFA0A04FC94B}">
-              <ma14:wrappingTextBoxFlag xmlns:ma14="http://schemas.microsoft.com/office/mac/drawingml/2011/main" xmlns="" val="1"/>
-            </a:ext>
-          </a:extLst>
-        </p:spPr>
-        <p:txBody>
-          <a:bodyPr wrap="none" lIns="50800" tIns="50800" rIns="50800" bIns="50800" anchor="ctr">
-            <a:spAutoFit/>
-          </a:bodyPr>
-          <a:lstStyle>
-            <a:lvl1pPr>
-              <a:defRPr>
-                <a:solidFill>
-                  <a:schemeClr val="accent5">
-                    <a:hueOff val="-444211"/>
-                    <a:satOff val="-14915"/>
-                    <a:lumOff val="22857"/>
-                  </a:schemeClr>
-                </a:solidFill>
-              </a:defRPr>
-            </a:lvl1pPr>
-          </a:lstStyle>
-          <a:p>
-            <a:r>
-              <a:t>Dependencies</a:t>
-            </a:r>
-          </a:p>
-        </p:txBody>
-      </p:sp>
-    </p:spTree>
+    <p:extLst>
+      <p:ext uri="{BB962C8B-B14F-4D97-AF65-F5344CB8AC3E}">
+        <p14:creationId xmlns:p14="http://schemas.microsoft.com/office/powerpoint/2010/main" val="2115180667"/>
+      </p:ext>
+    </p:extLst>
   </p:cSld>
   <p:clrMapOvr>
     <a:masterClrMapping/>

</xml_diff>